<commit_message>
Imporve NIST data leakage: MFT and logFile analysis
</commit_message>
<xml_diff>
--- a/NIST_Data_Leakage_Case/NIST_Data_Leakage_07_NetworkDrive_Cloud.pptx
+++ b/NIST_Data_Leakage_Case/NIST_Data_Leakage_07_NetworkDrive_Cloud.pptx
@@ -5,38 +5,41 @@
     <p:sldMasterId id="2147483648" r:id="rId1"/>
   </p:sldMasterIdLst>
   <p:notesMasterIdLst>
-    <p:notesMasterId r:id="rId31"/>
+    <p:notesMasterId r:id="rId34"/>
   </p:notesMasterIdLst>
   <p:sldIdLst>
     <p:sldId id="256" r:id="rId2"/>
-    <p:sldId id="257" r:id="rId3"/>
-    <p:sldId id="285" r:id="rId4"/>
-    <p:sldId id="286" r:id="rId5"/>
-    <p:sldId id="261" r:id="rId6"/>
-    <p:sldId id="262" r:id="rId7"/>
-    <p:sldId id="263" r:id="rId8"/>
-    <p:sldId id="260" r:id="rId9"/>
-    <p:sldId id="266" r:id="rId10"/>
-    <p:sldId id="265" r:id="rId11"/>
-    <p:sldId id="267" r:id="rId12"/>
-    <p:sldId id="268" r:id="rId13"/>
-    <p:sldId id="264" r:id="rId14"/>
-    <p:sldId id="269" r:id="rId15"/>
-    <p:sldId id="270" r:id="rId16"/>
-    <p:sldId id="271" r:id="rId17"/>
-    <p:sldId id="272" r:id="rId18"/>
-    <p:sldId id="273" r:id="rId19"/>
-    <p:sldId id="274" r:id="rId20"/>
-    <p:sldId id="275" r:id="rId21"/>
-    <p:sldId id="276" r:id="rId22"/>
-    <p:sldId id="278" r:id="rId23"/>
-    <p:sldId id="277" r:id="rId24"/>
-    <p:sldId id="279" r:id="rId25"/>
-    <p:sldId id="280" r:id="rId26"/>
-    <p:sldId id="282" r:id="rId27"/>
-    <p:sldId id="281" r:id="rId28"/>
-    <p:sldId id="283" r:id="rId29"/>
-    <p:sldId id="284" r:id="rId30"/>
+    <p:sldId id="287" r:id="rId3"/>
+    <p:sldId id="257" r:id="rId4"/>
+    <p:sldId id="285" r:id="rId5"/>
+    <p:sldId id="286" r:id="rId6"/>
+    <p:sldId id="288" r:id="rId7"/>
+    <p:sldId id="289" r:id="rId8"/>
+    <p:sldId id="261" r:id="rId9"/>
+    <p:sldId id="262" r:id="rId10"/>
+    <p:sldId id="263" r:id="rId11"/>
+    <p:sldId id="260" r:id="rId12"/>
+    <p:sldId id="266" r:id="rId13"/>
+    <p:sldId id="265" r:id="rId14"/>
+    <p:sldId id="267" r:id="rId15"/>
+    <p:sldId id="268" r:id="rId16"/>
+    <p:sldId id="264" r:id="rId17"/>
+    <p:sldId id="269" r:id="rId18"/>
+    <p:sldId id="270" r:id="rId19"/>
+    <p:sldId id="271" r:id="rId20"/>
+    <p:sldId id="272" r:id="rId21"/>
+    <p:sldId id="273" r:id="rId22"/>
+    <p:sldId id="274" r:id="rId23"/>
+    <p:sldId id="275" r:id="rId24"/>
+    <p:sldId id="276" r:id="rId25"/>
+    <p:sldId id="278" r:id="rId26"/>
+    <p:sldId id="277" r:id="rId27"/>
+    <p:sldId id="279" r:id="rId28"/>
+    <p:sldId id="280" r:id="rId29"/>
+    <p:sldId id="282" r:id="rId30"/>
+    <p:sldId id="281" r:id="rId31"/>
+    <p:sldId id="283" r:id="rId32"/>
+    <p:sldId id="284" r:id="rId33"/>
   </p:sldIdLst>
   <p:sldSz cx="12192000" cy="6858000"/>
   <p:notesSz cx="6858000" cy="9144000"/>
@@ -146,7 +149,7 @@
 <file path=ppt/revisionInfo.xml><?xml version="1.0" encoding="utf-8"?>
 <p1510:revInfo xmlns:a="http://schemas.openxmlformats.org/drawingml/2006/main" xmlns:r="http://schemas.openxmlformats.org/officeDocument/2006/relationships" xmlns:p1510="http://schemas.microsoft.com/office/powerpoint/2015/10/main">
   <p1510:revLst>
-    <p1510:client id="{C88A9641-6870-405A-ACD5-6A71A77EE40E}" v="8" dt="2021-11-09T20:28:44.330"/>
+    <p1510:client id="{C88A9641-6870-405A-ACD5-6A71A77EE40E}" v="19" dt="2021-11-17T00:45:11.840"/>
   </p1510:revLst>
 </p1510:revInfo>
 </file>
@@ -288,23 +291,46 @@
   </pc:docChgLst>
   <pc:docChgLst>
     <pc:chgData name="Weifeng Xu" userId="e7aed605-a3dd-4d5a-a692-a87037af107b" providerId="ADAL" clId="{C88A9641-6870-405A-ACD5-6A71A77EE40E}"/>
-    <pc:docChg chg="undo redo custSel modSld">
-      <pc:chgData name="Weifeng Xu" userId="e7aed605-a3dd-4d5a-a692-a87037af107b" providerId="ADAL" clId="{C88A9641-6870-405A-ACD5-6A71A77EE40E}" dt="2021-11-13T03:16:58.033" v="200" actId="20577"/>
+    <pc:docChg chg="undo redo custSel addSld delSld modSld">
+      <pc:chgData name="Weifeng Xu" userId="e7aed605-a3dd-4d5a-a692-a87037af107b" providerId="ADAL" clId="{C88A9641-6870-405A-ACD5-6A71A77EE40E}" dt="2021-11-16T23:33:46.374" v="680" actId="20577"/>
       <pc:docMkLst>
         <pc:docMk/>
       </pc:docMkLst>
-      <pc:sldChg chg="modSp mod">
-        <pc:chgData name="Weifeng Xu" userId="e7aed605-a3dd-4d5a-a692-a87037af107b" providerId="ADAL" clId="{C88A9641-6870-405A-ACD5-6A71A77EE40E}" dt="2021-11-13T03:16:58.033" v="200" actId="20577"/>
+      <pc:sldChg chg="modSp mod modNotesTx">
+        <pc:chgData name="Weifeng Xu" userId="e7aed605-a3dd-4d5a-a692-a87037af107b" providerId="ADAL" clId="{C88A9641-6870-405A-ACD5-6A71A77EE40E}" dt="2021-11-16T20:59:22.695" v="676" actId="6549"/>
         <pc:sldMkLst>
           <pc:docMk/>
           <pc:sldMk cId="162022530" sldId="256"/>
         </pc:sldMkLst>
         <pc:spChg chg="mod">
-          <ac:chgData name="Weifeng Xu" userId="e7aed605-a3dd-4d5a-a692-a87037af107b" providerId="ADAL" clId="{C88A9641-6870-405A-ACD5-6A71A77EE40E}" dt="2021-11-13T03:16:58.033" v="200" actId="20577"/>
+          <ac:chgData name="Weifeng Xu" userId="e7aed605-a3dd-4d5a-a692-a87037af107b" providerId="ADAL" clId="{C88A9641-6870-405A-ACD5-6A71A77EE40E}" dt="2021-11-13T15:27:37.179" v="249" actId="20577"/>
           <ac:spMkLst>
             <pc:docMk/>
             <pc:sldMk cId="162022530" sldId="256"/>
             <ac:spMk id="3" creationId="{00000000-0000-0000-0000-000000000000}"/>
+          </ac:spMkLst>
+        </pc:spChg>
+      </pc:sldChg>
+      <pc:sldChg chg="addSp modSp mod">
+        <pc:chgData name="Weifeng Xu" userId="e7aed605-a3dd-4d5a-a692-a87037af107b" providerId="ADAL" clId="{C88A9641-6870-405A-ACD5-6A71A77EE40E}" dt="2021-11-13T03:47:41.200" v="218" actId="207"/>
+        <pc:sldMkLst>
+          <pc:docMk/>
+          <pc:sldMk cId="3149611631" sldId="264"/>
+        </pc:sldMkLst>
+        <pc:spChg chg="add mod">
+          <ac:chgData name="Weifeng Xu" userId="e7aed605-a3dd-4d5a-a692-a87037af107b" providerId="ADAL" clId="{C88A9641-6870-405A-ACD5-6A71A77EE40E}" dt="2021-11-13T03:47:17.738" v="204" actId="1076"/>
+          <ac:spMkLst>
+            <pc:docMk/>
+            <pc:sldMk cId="3149611631" sldId="264"/>
+            <ac:spMk id="4" creationId="{ADAFF1AC-213B-4922-8843-9315FCDAA337}"/>
+          </ac:spMkLst>
+        </pc:spChg>
+        <pc:spChg chg="add mod">
+          <ac:chgData name="Weifeng Xu" userId="e7aed605-a3dd-4d5a-a692-a87037af107b" providerId="ADAL" clId="{C88A9641-6870-405A-ACD5-6A71A77EE40E}" dt="2021-11-13T03:47:41.200" v="218" actId="207"/>
+          <ac:spMkLst>
+            <pc:docMk/>
+            <pc:sldMk cId="3149611631" sldId="264"/>
+            <ac:spMk id="5" creationId="{C004582E-6201-42C3-B643-1B5FCB35DC84}"/>
           </ac:spMkLst>
         </pc:spChg>
       </pc:sldChg>
@@ -330,6 +356,21 @@
             <ac:cxnSpMk id="6" creationId="{4AF79A65-623F-4AD1-B0DE-6F391BA525FB}"/>
           </ac:cxnSpMkLst>
         </pc:cxnChg>
+      </pc:sldChg>
+      <pc:sldChg chg="modSp mod">
+        <pc:chgData name="Weifeng Xu" userId="e7aed605-a3dd-4d5a-a692-a87037af107b" providerId="ADAL" clId="{C88A9641-6870-405A-ACD5-6A71A77EE40E}" dt="2021-11-13T15:25:14.573" v="237" actId="20577"/>
+        <pc:sldMkLst>
+          <pc:docMk/>
+          <pc:sldMk cId="214669444" sldId="273"/>
+        </pc:sldMkLst>
+        <pc:spChg chg="mod">
+          <ac:chgData name="Weifeng Xu" userId="e7aed605-a3dd-4d5a-a692-a87037af107b" providerId="ADAL" clId="{C88A9641-6870-405A-ACD5-6A71A77EE40E}" dt="2021-11-13T15:25:14.573" v="237" actId="20577"/>
+          <ac:spMkLst>
+            <pc:docMk/>
+            <pc:sldMk cId="214669444" sldId="273"/>
+            <ac:spMk id="3" creationId="{00000000-0000-0000-0000-000000000000}"/>
+          </ac:spMkLst>
+        </pc:spChg>
       </pc:sldChg>
       <pc:sldChg chg="addSp delSp modSp mod">
         <pc:chgData name="Weifeng Xu" userId="e7aed605-a3dd-4d5a-a692-a87037af107b" providerId="ADAL" clId="{C88A9641-6870-405A-ACD5-6A71A77EE40E}" dt="2021-11-09T20:31:38.731" v="115" actId="207"/>
@@ -440,6 +481,223 @@
           </ac:spMkLst>
         </pc:spChg>
       </pc:sldChg>
+      <pc:sldChg chg="addSp modSp mod">
+        <pc:chgData name="Weifeng Xu" userId="e7aed605-a3dd-4d5a-a692-a87037af107b" providerId="ADAL" clId="{C88A9641-6870-405A-ACD5-6A71A77EE40E}" dt="2021-11-16T03:19:02.642" v="486" actId="14100"/>
+        <pc:sldMkLst>
+          <pc:docMk/>
+          <pc:sldMk cId="1081932749" sldId="285"/>
+        </pc:sldMkLst>
+        <pc:spChg chg="add mod">
+          <ac:chgData name="Weifeng Xu" userId="e7aed605-a3dd-4d5a-a692-a87037af107b" providerId="ADAL" clId="{C88A9641-6870-405A-ACD5-6A71A77EE40E}" dt="2021-11-16T03:19:02.642" v="486" actId="14100"/>
+          <ac:spMkLst>
+            <pc:docMk/>
+            <pc:sldMk cId="1081932749" sldId="285"/>
+            <ac:spMk id="10" creationId="{4C0A2281-8345-4E76-A7AF-5CDEB96A71DE}"/>
+          </ac:spMkLst>
+        </pc:spChg>
+        <pc:picChg chg="mod">
+          <ac:chgData name="Weifeng Xu" userId="e7aed605-a3dd-4d5a-a692-a87037af107b" providerId="ADAL" clId="{C88A9641-6870-405A-ACD5-6A71A77EE40E}" dt="2021-11-16T03:16:53.567" v="481" actId="1076"/>
+          <ac:picMkLst>
+            <pc:docMk/>
+            <pc:sldMk cId="1081932749" sldId="285"/>
+            <ac:picMk id="4" creationId="{00000000-0000-0000-0000-000000000000}"/>
+          </ac:picMkLst>
+        </pc:picChg>
+        <pc:cxnChg chg="add mod">
+          <ac:chgData name="Weifeng Xu" userId="e7aed605-a3dd-4d5a-a692-a87037af107b" providerId="ADAL" clId="{C88A9641-6870-405A-ACD5-6A71A77EE40E}" dt="2021-11-16T03:17:16.486" v="483" actId="13822"/>
+          <ac:cxnSpMkLst>
+            <pc:docMk/>
+            <pc:sldMk cId="1081932749" sldId="285"/>
+            <ac:cxnSpMk id="7" creationId="{FD5F9C8A-6D8D-4F77-975F-0C8FB8231FCB}"/>
+          </ac:cxnSpMkLst>
+        </pc:cxnChg>
+      </pc:sldChg>
+      <pc:sldChg chg="addSp delSp modSp mod modNotesTx">
+        <pc:chgData name="Weifeng Xu" userId="e7aed605-a3dd-4d5a-a692-a87037af107b" providerId="ADAL" clId="{C88A9641-6870-405A-ACD5-6A71A77EE40E}" dt="2021-11-16T03:53:20.225" v="657" actId="14100"/>
+        <pc:sldMkLst>
+          <pc:docMk/>
+          <pc:sldMk cId="3299497375" sldId="286"/>
+        </pc:sldMkLst>
+        <pc:spChg chg="del">
+          <ac:chgData name="Weifeng Xu" userId="e7aed605-a3dd-4d5a-a692-a87037af107b" providerId="ADAL" clId="{C88A9641-6870-405A-ACD5-6A71A77EE40E}" dt="2021-11-16T03:28:00.279" v="491" actId="21"/>
+          <ac:spMkLst>
+            <pc:docMk/>
+            <pc:sldMk cId="3299497375" sldId="286"/>
+            <ac:spMk id="6" creationId="{00000000-0000-0000-0000-000000000000}"/>
+          </ac:spMkLst>
+        </pc:spChg>
+        <pc:spChg chg="add mod">
+          <ac:chgData name="Weifeng Xu" userId="e7aed605-a3dd-4d5a-a692-a87037af107b" providerId="ADAL" clId="{C88A9641-6870-405A-ACD5-6A71A77EE40E}" dt="2021-11-16T03:44:29.743" v="622" actId="20577"/>
+          <ac:spMkLst>
+            <pc:docMk/>
+            <pc:sldMk cId="3299497375" sldId="286"/>
+            <ac:spMk id="7" creationId="{4EC7A8FB-A718-4708-BCF8-7B8FEEEA11CD}"/>
+          </ac:spMkLst>
+        </pc:spChg>
+        <pc:spChg chg="add mod">
+          <ac:chgData name="Weifeng Xu" userId="e7aed605-a3dd-4d5a-a692-a87037af107b" providerId="ADAL" clId="{C88A9641-6870-405A-ACD5-6A71A77EE40E}" dt="2021-11-16T03:30:23.556" v="533" actId="14100"/>
+          <ac:spMkLst>
+            <pc:docMk/>
+            <pc:sldMk cId="3299497375" sldId="286"/>
+            <ac:spMk id="10" creationId="{63B22BAB-3138-4EFE-8912-752AF35655E7}"/>
+          </ac:spMkLst>
+        </pc:spChg>
+        <pc:spChg chg="add mod">
+          <ac:chgData name="Weifeng Xu" userId="e7aed605-a3dd-4d5a-a692-a87037af107b" providerId="ADAL" clId="{C88A9641-6870-405A-ACD5-6A71A77EE40E}" dt="2021-11-16T03:30:33.016" v="536" actId="14100"/>
+          <ac:spMkLst>
+            <pc:docMk/>
+            <pc:sldMk cId="3299497375" sldId="286"/>
+            <ac:spMk id="11" creationId="{E19AC702-D50F-4F43-987E-F9B6B1119D96}"/>
+          </ac:spMkLst>
+        </pc:spChg>
+        <pc:picChg chg="del">
+          <ac:chgData name="Weifeng Xu" userId="e7aed605-a3dd-4d5a-a692-a87037af107b" providerId="ADAL" clId="{C88A9641-6870-405A-ACD5-6A71A77EE40E}" dt="2021-11-16T03:28:00.279" v="491" actId="21"/>
+          <ac:picMkLst>
+            <pc:docMk/>
+            <pc:sldMk cId="3299497375" sldId="286"/>
+            <ac:picMk id="5" creationId="{00000000-0000-0000-0000-000000000000}"/>
+          </ac:picMkLst>
+        </pc:picChg>
+        <pc:cxnChg chg="add mod">
+          <ac:chgData name="Weifeng Xu" userId="e7aed605-a3dd-4d5a-a692-a87037af107b" providerId="ADAL" clId="{C88A9641-6870-405A-ACD5-6A71A77EE40E}" dt="2021-11-16T03:53:20.225" v="657" actId="14100"/>
+          <ac:cxnSpMkLst>
+            <pc:docMk/>
+            <pc:sldMk cId="3299497375" sldId="286"/>
+            <ac:cxnSpMk id="9" creationId="{1E94DE38-CE42-40AC-A151-53C75E83A378}"/>
+          </ac:cxnSpMkLst>
+        </pc:cxnChg>
+      </pc:sldChg>
+      <pc:sldChg chg="modSp new mod">
+        <pc:chgData name="Weifeng Xu" userId="e7aed605-a3dd-4d5a-a692-a87037af107b" providerId="ADAL" clId="{C88A9641-6870-405A-ACD5-6A71A77EE40E}" dt="2021-11-16T02:53:12.599" v="478" actId="6549"/>
+        <pc:sldMkLst>
+          <pc:docMk/>
+          <pc:sldMk cId="2772101945" sldId="287"/>
+        </pc:sldMkLst>
+        <pc:spChg chg="mod">
+          <ac:chgData name="Weifeng Xu" userId="e7aed605-a3dd-4d5a-a692-a87037af107b" providerId="ADAL" clId="{C88A9641-6870-405A-ACD5-6A71A77EE40E}" dt="2021-11-13T15:31:57.042" v="344" actId="20577"/>
+          <ac:spMkLst>
+            <pc:docMk/>
+            <pc:sldMk cId="2772101945" sldId="287"/>
+            <ac:spMk id="2" creationId="{CA125AEA-7A84-4F6A-A146-D497F71BE68F}"/>
+          </ac:spMkLst>
+        </pc:spChg>
+        <pc:spChg chg="mod">
+          <ac:chgData name="Weifeng Xu" userId="e7aed605-a3dd-4d5a-a692-a87037af107b" providerId="ADAL" clId="{C88A9641-6870-405A-ACD5-6A71A77EE40E}" dt="2021-11-16T02:53:12.599" v="478" actId="6549"/>
+          <ac:spMkLst>
+            <pc:docMk/>
+            <pc:sldMk cId="2772101945" sldId="287"/>
+            <ac:spMk id="3" creationId="{53A2B3A9-CADA-4EE7-963F-CCF7898F9DD2}"/>
+          </ac:spMkLst>
+        </pc:spChg>
+      </pc:sldChg>
+      <pc:sldChg chg="addSp delSp modSp new mod modClrScheme chgLayout modNotesTx">
+        <pc:chgData name="Weifeng Xu" userId="e7aed605-a3dd-4d5a-a692-a87037af107b" providerId="ADAL" clId="{C88A9641-6870-405A-ACD5-6A71A77EE40E}" dt="2021-11-16T23:33:46.374" v="680" actId="20577"/>
+        <pc:sldMkLst>
+          <pc:docMk/>
+          <pc:sldMk cId="2640566923" sldId="288"/>
+        </pc:sldMkLst>
+        <pc:spChg chg="del">
+          <ac:chgData name="Weifeng Xu" userId="e7aed605-a3dd-4d5a-a692-a87037af107b" providerId="ADAL" clId="{C88A9641-6870-405A-ACD5-6A71A77EE40E}" dt="2021-11-16T03:31:32.051" v="576" actId="700"/>
+          <ac:spMkLst>
+            <pc:docMk/>
+            <pc:sldMk cId="2640566923" sldId="288"/>
+            <ac:spMk id="2" creationId="{E929C9FD-DFDA-418B-8DDB-4F2B66CDDE8A}"/>
+          </ac:spMkLst>
+        </pc:spChg>
+        <pc:spChg chg="add mod">
+          <ac:chgData name="Weifeng Xu" userId="e7aed605-a3dd-4d5a-a692-a87037af107b" providerId="ADAL" clId="{C88A9641-6870-405A-ACD5-6A71A77EE40E}" dt="2021-11-16T03:32:59.012" v="612" actId="20577"/>
+          <ac:spMkLst>
+            <pc:docMk/>
+            <pc:sldMk cId="2640566923" sldId="288"/>
+            <ac:spMk id="5" creationId="{03A1B2C4-15C4-47A7-AE04-609C4C173A2D}"/>
+          </ac:spMkLst>
+        </pc:spChg>
+        <pc:spChg chg="add mod">
+          <ac:chgData name="Weifeng Xu" userId="e7aed605-a3dd-4d5a-a692-a87037af107b" providerId="ADAL" clId="{C88A9641-6870-405A-ACD5-6A71A77EE40E}" dt="2021-11-16T03:34:07.376" v="616" actId="1582"/>
+          <ac:spMkLst>
+            <pc:docMk/>
+            <pc:sldMk cId="2640566923" sldId="288"/>
+            <ac:spMk id="6" creationId="{ABB5FCAE-D7B5-4F62-99E4-49D0DC08E07A}"/>
+          </ac:spMkLst>
+        </pc:spChg>
+        <pc:spChg chg="add mod">
+          <ac:chgData name="Weifeng Xu" userId="e7aed605-a3dd-4d5a-a692-a87037af107b" providerId="ADAL" clId="{C88A9641-6870-405A-ACD5-6A71A77EE40E}" dt="2021-11-16T03:54:05.483" v="669" actId="1036"/>
+          <ac:spMkLst>
+            <pc:docMk/>
+            <pc:sldMk cId="2640566923" sldId="288"/>
+            <ac:spMk id="7" creationId="{438C8748-730C-4849-B0FD-20F87A59CB5D}"/>
+          </ac:spMkLst>
+        </pc:spChg>
+        <pc:picChg chg="add mod">
+          <ac:chgData name="Weifeng Xu" userId="e7aed605-a3dd-4d5a-a692-a87037af107b" providerId="ADAL" clId="{C88A9641-6870-405A-ACD5-6A71A77EE40E}" dt="2021-11-16T03:53:52.684" v="664" actId="1076"/>
+          <ac:picMkLst>
+            <pc:docMk/>
+            <pc:sldMk cId="2640566923" sldId="288"/>
+            <ac:picMk id="4" creationId="{07D2826B-24FA-4CA1-8683-49A9A80BAE2C}"/>
+          </ac:picMkLst>
+        </pc:picChg>
+      </pc:sldChg>
+      <pc:sldChg chg="addSp delSp modSp new mod modClrScheme chgLayout modNotesTx">
+        <pc:chgData name="Weifeng Xu" userId="e7aed605-a3dd-4d5a-a692-a87037af107b" providerId="ADAL" clId="{C88A9641-6870-405A-ACD5-6A71A77EE40E}" dt="2021-11-16T03:54:44.890" v="675" actId="20577"/>
+        <pc:sldMkLst>
+          <pc:docMk/>
+          <pc:sldMk cId="2027897214" sldId="289"/>
+        </pc:sldMkLst>
+        <pc:spChg chg="del">
+          <ac:chgData name="Weifeng Xu" userId="e7aed605-a3dd-4d5a-a692-a87037af107b" providerId="ADAL" clId="{C88A9641-6870-405A-ACD5-6A71A77EE40E}" dt="2021-11-16T03:28:11.865" v="493" actId="700"/>
+          <ac:spMkLst>
+            <pc:docMk/>
+            <pc:sldMk cId="2027897214" sldId="289"/>
+            <ac:spMk id="2" creationId="{68EC0ECD-B87A-47EA-B594-C2D5D9D44A49}"/>
+          </ac:spMkLst>
+        </pc:spChg>
+        <pc:spChg chg="add mod">
+          <ac:chgData name="Weifeng Xu" userId="e7aed605-a3dd-4d5a-a692-a87037af107b" providerId="ADAL" clId="{C88A9641-6870-405A-ACD5-6A71A77EE40E}" dt="2021-11-16T03:54:44.890" v="675" actId="20577"/>
+          <ac:spMkLst>
+            <pc:docMk/>
+            <pc:sldMk cId="2027897214" sldId="289"/>
+            <ac:spMk id="4" creationId="{BDD03DC8-96B7-48A0-B081-D8D26ED63FE0}"/>
+          </ac:spMkLst>
+        </pc:spChg>
+        <pc:picChg chg="add mod">
+          <ac:chgData name="Weifeng Xu" userId="e7aed605-a3dd-4d5a-a692-a87037af107b" providerId="ADAL" clId="{C88A9641-6870-405A-ACD5-6A71A77EE40E}" dt="2021-11-16T03:45:47.877" v="623" actId="1076"/>
+          <ac:picMkLst>
+            <pc:docMk/>
+            <pc:sldMk cId="2027897214" sldId="289"/>
+            <ac:picMk id="3" creationId="{07F89BB5-471F-4A85-8381-073BB5AB5A0D}"/>
+          </ac:picMkLst>
+        </pc:picChg>
+      </pc:sldChg>
+      <pc:sldChg chg="delSp new del mod modClrScheme chgLayout">
+        <pc:chgData name="Weifeng Xu" userId="e7aed605-a3dd-4d5a-a692-a87037af107b" providerId="ADAL" clId="{C88A9641-6870-405A-ACD5-6A71A77EE40E}" dt="2021-11-16T23:15:41.428" v="679" actId="47"/>
+        <pc:sldMkLst>
+          <pc:docMk/>
+          <pc:sldMk cId="1795065832" sldId="290"/>
+        </pc:sldMkLst>
+        <pc:spChg chg="del">
+          <ac:chgData name="Weifeng Xu" userId="e7aed605-a3dd-4d5a-a692-a87037af107b" providerId="ADAL" clId="{C88A9641-6870-405A-ACD5-6A71A77EE40E}" dt="2021-11-16T22:36:10.414" v="678" actId="700"/>
+          <ac:spMkLst>
+            <pc:docMk/>
+            <pc:sldMk cId="1795065832" sldId="290"/>
+            <ac:spMk id="2" creationId="{3A5D6A2E-8565-44DB-A40D-0329A514A0BF}"/>
+          </ac:spMkLst>
+        </pc:spChg>
+        <pc:spChg chg="del">
+          <ac:chgData name="Weifeng Xu" userId="e7aed605-a3dd-4d5a-a692-a87037af107b" providerId="ADAL" clId="{C88A9641-6870-405A-ACD5-6A71A77EE40E}" dt="2021-11-16T22:36:10.414" v="678" actId="700"/>
+          <ac:spMkLst>
+            <pc:docMk/>
+            <pc:sldMk cId="1795065832" sldId="290"/>
+            <ac:spMk id="3" creationId="{B95E463C-B1FB-448A-9DF7-7E3944B4D914}"/>
+          </ac:spMkLst>
+        </pc:spChg>
+      </pc:sldChg>
+      <pc:sldChg chg="new del">
+        <pc:chgData name="Weifeng Xu" userId="e7aed605-a3dd-4d5a-a692-a87037af107b" providerId="ADAL" clId="{C88A9641-6870-405A-ACD5-6A71A77EE40E}" dt="2021-11-16T03:53:02.782" v="655" actId="680"/>
+        <pc:sldMkLst>
+          <pc:docMk/>
+          <pc:sldMk cId="3784024112" sldId="290"/>
+        </pc:sldMkLst>
+      </pc:sldChg>
     </pc:docChg>
   </pc:docChgLst>
   <pc:docChgLst>
@@ -583,7 +841,7 @@
           <a:p>
             <a:fld id="{EE41F6E3-57F9-402E-BDBA-5B2DE11C8530}" type="datetimeFigureOut">
               <a:rPr lang="en-US" smtClean="0"/>
-              <a:t>11/12/2021</a:t>
+              <a:t>11/16/2021</a:t>
             </a:fld>
             <a:endParaRPr lang="en-US"/>
           </a:p>
@@ -894,10 +1152,7 @@
           <a:bodyPr/>
           <a:lstStyle/>
           <a:p>
-            <a:r>
-              <a:rPr lang="en-US" dirty="0"/>
-              <a:t>http://xmlstar.sourceforge.net/doc/UG/</a:t>
-            </a:r>
+            <a:endParaRPr lang="en-US" dirty="0"/>
           </a:p>
         </p:txBody>
       </p:sp>
@@ -983,53 +1238,34 @@
           <a:p>
             <a:r>
               <a:rPr lang="en-US" dirty="0" err="1"/>
-              <a:t>hivexsh</a:t>
-            </a:r>
-            <a:r>
-              <a:rPr lang="en-US" dirty="0"/>
-              <a:t> NTUSER_informant.DAT</a:t>
-            </a:r>
-          </a:p>
-          <a:p>
-            <a:r>
-              <a:rPr lang="en-US" dirty="0"/>
-              <a:t>cd Software\Microsoft\Office\15.0\Excel\File MRU</a:t>
-            </a:r>
-          </a:p>
-          <a:p>
+              <a:t>lnkinfo</a:t>
+            </a:r>
+            <a:r>
+              <a:rPr lang="en-US" dirty="0"/>
+              <a:t> /media/root/C8CA0C8DCA0C7A48/Users/informant/</a:t>
+            </a:r>
             <a:r>
               <a:rPr lang="en-US" dirty="0" err="1"/>
-              <a:t>lsval</a:t>
-            </a:r>
+              <a:t>AppData</a:t>
+            </a:r>
+            <a:r>
+              <a:rPr lang="en-US" dirty="0"/>
+              <a:t>/Roaming/Microsoft/Windows/Recent/'pricing </a:t>
+            </a:r>
+            <a:r>
+              <a:rPr lang="en-US" dirty="0" err="1"/>
+              <a:t>decision.lnk</a:t>
+            </a:r>
+            <a:r>
+              <a:rPr lang="en-US" dirty="0"/>
+              <a:t>'</a:t>
+            </a:r>
+          </a:p>
+          <a:p>
             <a:endParaRPr lang="en-US" dirty="0"/>
           </a:p>
           <a:p>
-            <a:r>
-              <a:rPr lang="en-US" dirty="0"/>
-              <a:t>"Item 1"="[F00000000][T01D065A7B4C94EE2][O00000000]*\\\\10.11.11.128\\</a:t>
-            </a:r>
-            <a:r>
-              <a:rPr lang="en-US" dirty="0" err="1"/>
-              <a:t>secured_drive</a:t>
-            </a:r>
-            <a:r>
-              <a:rPr lang="en-US" dirty="0"/>
-              <a:t>\\Secret Project Data\\pricing decision\\(</a:t>
-            </a:r>
-            <a:r>
-              <a:rPr lang="en-US" dirty="0" err="1"/>
-              <a:t>secret_project</a:t>
-            </a:r>
-            <a:r>
-              <a:rPr lang="en-US" dirty="0"/>
-              <a:t>)_pricing_decision.xlsx“</a:t>
-            </a:r>
-          </a:p>
-          <a:p>
-            <a:r>
-              <a:rPr lang="en-US" dirty="0"/>
-              <a:t>https://www.taksati.org/mru/</a:t>
-            </a:r>
+            <a:endParaRPr lang="en-US" dirty="0"/>
           </a:p>
         </p:txBody>
       </p:sp>
@@ -1059,7 +1295,7 @@
     </p:spTree>
     <p:extLst>
       <p:ext uri="{BB962C8B-B14F-4D97-AF65-F5344CB8AC3E}">
-        <p14:creationId xmlns:p14="http://schemas.microsoft.com/office/powerpoint/2010/main" val="3902265853"/>
+        <p14:creationId xmlns:p14="http://schemas.microsoft.com/office/powerpoint/2010/main" val="3105263736"/>
       </p:ext>
     </p:extLst>
   </p:cSld>
@@ -1114,14 +1350,36 @@
           <a:lstStyle/>
           <a:p>
             <a:r>
-              <a:rPr lang="en-US" dirty="0"/>
-              <a:t>https://www.dmares.com/maresware/html/dateconv.htm</a:t>
-            </a:r>
-          </a:p>
-          <a:p>
-            <a:r>
-              <a:rPr lang="en-US" dirty="0"/>
-              <a:t>https://www.silisoftware.com/tools/date.php?inputdate=130716160160780002&amp;inputformat=filetime</a:t>
+              <a:rPr lang="en-US" dirty="0" err="1"/>
+              <a:t>lnkinfo</a:t>
+            </a:r>
+            <a:r>
+              <a:rPr lang="en-US" dirty="0"/>
+              <a:t> /media/root/C8CA0C8DCA0C7A48/Users/informant/</a:t>
+            </a:r>
+            <a:r>
+              <a:rPr lang="en-US" dirty="0" err="1"/>
+              <a:t>AppData</a:t>
+            </a:r>
+            <a:r>
+              <a:rPr lang="en-US" dirty="0"/>
+              <a:t>/Roaming/Microsoft/Windows/Recent/'(</a:t>
+            </a:r>
+            <a:r>
+              <a:rPr lang="en-US" dirty="0" err="1"/>
+              <a:t>secret_project</a:t>
+            </a:r>
+            <a:r>
+              <a:rPr lang="en-US" dirty="0"/>
+              <a:t>)_</a:t>
+            </a:r>
+            <a:r>
+              <a:rPr lang="en-US" dirty="0" err="1"/>
+              <a:t>pricing_decision.xlsx.lnk</a:t>
+            </a:r>
+            <a:r>
+              <a:rPr lang="en-US" dirty="0"/>
+              <a:t>'</a:t>
             </a:r>
           </a:p>
         </p:txBody>
@@ -1152,7 +1410,7 @@
     </p:spTree>
     <p:extLst>
       <p:ext uri="{BB962C8B-B14F-4D97-AF65-F5344CB8AC3E}">
-        <p14:creationId xmlns:p14="http://schemas.microsoft.com/office/powerpoint/2010/main" val="4122080375"/>
+        <p14:creationId xmlns:p14="http://schemas.microsoft.com/office/powerpoint/2010/main" val="731191471"/>
       </p:ext>
     </p:extLst>
   </p:cSld>
@@ -1207,14 +1465,53 @@
           <a:lstStyle/>
           <a:p>
             <a:r>
-              <a:rPr lang="en-US" dirty="0"/>
-              <a:t>https://github.com/digitalsleuth/time_decode</a:t>
-            </a:r>
-          </a:p>
-          <a:p>
-            <a:r>
-              <a:rPr lang="en-US" dirty="0"/>
-              <a:t>https://dfdatetime.readthedocs.io/en/latest/index.html</a:t>
+              <a:rPr lang="en-US" dirty="0" err="1"/>
+              <a:t>hivexsh</a:t>
+            </a:r>
+            <a:r>
+              <a:rPr lang="en-US" dirty="0"/>
+              <a:t> NTUSER_informant.DAT</a:t>
+            </a:r>
+          </a:p>
+          <a:p>
+            <a:r>
+              <a:rPr lang="en-US" dirty="0"/>
+              <a:t>cd Software\Microsoft\Office\15.0\Excel\File MRU</a:t>
+            </a:r>
+          </a:p>
+          <a:p>
+            <a:r>
+              <a:rPr lang="en-US" dirty="0" err="1"/>
+              <a:t>lsval</a:t>
+            </a:r>
+            <a:endParaRPr lang="en-US" dirty="0"/>
+          </a:p>
+          <a:p>
+            <a:r>
+              <a:rPr lang="en-US" dirty="0"/>
+              <a:t>"Item 1"="[F00000000][T01D065A7B4C94EE2][O00000000]*\\\\10.11.11.128\\</a:t>
+            </a:r>
+            <a:r>
+              <a:rPr lang="en-US" dirty="0" err="1"/>
+              <a:t>secured_drive</a:t>
+            </a:r>
+            <a:r>
+              <a:rPr lang="en-US" dirty="0"/>
+              <a:t>\\Secret Project Data\\pricing decision\\(</a:t>
+            </a:r>
+            <a:r>
+              <a:rPr lang="en-US" dirty="0" err="1"/>
+              <a:t>secret_project</a:t>
+            </a:r>
+            <a:r>
+              <a:rPr lang="en-US" dirty="0"/>
+              <a:t>)_pricing_decision.xlsx“</a:t>
+            </a:r>
+          </a:p>
+          <a:p>
+            <a:r>
+              <a:rPr lang="en-US" dirty="0"/>
+              <a:t>https://www.taksati.org/mru/</a:t>
             </a:r>
           </a:p>
         </p:txBody>
@@ -1236,7 +1533,7 @@
           <a:p>
             <a:fld id="{DDBF98C7-164A-4723-84F0-B1E4B080DDEC}" type="slidenum">
               <a:rPr lang="en-US" smtClean="0"/>
-              <a:t>16</a:t>
+              <a:t>17</a:t>
             </a:fld>
             <a:endParaRPr lang="en-US"/>
           </a:p>
@@ -1245,7 +1542,7 @@
     </p:spTree>
     <p:extLst>
       <p:ext uri="{BB962C8B-B14F-4D97-AF65-F5344CB8AC3E}">
-        <p14:creationId xmlns:p14="http://schemas.microsoft.com/office/powerpoint/2010/main" val="3157323882"/>
+        <p14:creationId xmlns:p14="http://schemas.microsoft.com/office/powerpoint/2010/main" val="3902265853"/>
       </p:ext>
     </p:extLst>
   </p:cSld>
@@ -1301,49 +1598,14 @@
           <a:p>
             <a:r>
               <a:rPr lang="en-US" dirty="0"/>
-              <a:t>find /media/root/C8CA0C8DCA0C7A48/Program\ Files\ \(x86\)/  -</a:t>
-            </a:r>
-            <a:r>
-              <a:rPr lang="en-US" dirty="0" err="1"/>
-              <a:t>regextype</a:t>
-            </a:r>
-            <a:r>
-              <a:rPr lang="en-US" dirty="0"/>
-              <a:t> grep  -regex  ".*google.*“</a:t>
-            </a:r>
-          </a:p>
-          <a:p>
-            <a:endParaRPr lang="en-US" dirty="0"/>
-          </a:p>
-          <a:p>
-            <a:r>
-              <a:rPr lang="en-US" dirty="0"/>
-              <a:t>Review: </a:t>
-            </a:r>
-            <a:r>
-              <a:rPr lang="en-US" sz="1200" b="0" i="0" kern="1200" dirty="0">
-                <a:solidFill>
-                  <a:schemeClr val="tx1"/>
-                </a:solidFill>
-                <a:effectLst/>
-                <a:latin typeface="+mn-lt"/>
-                <a:ea typeface="+mn-ea"/>
-                <a:cs typeface="+mn-cs"/>
-              </a:rPr>
-              <a:t>find . -type f -exec grep "example" '{}' \; -print</a:t>
-            </a:r>
-          </a:p>
-          <a:p>
-            <a:r>
-              <a:rPr lang="en-US" dirty="0"/>
-              <a:t>https://www.linode.com/docs/guides/find-files-in-linux-using-the-command-line/</a:t>
-            </a:r>
-          </a:p>
-          <a:p>
-            <a:endParaRPr lang="en-US" dirty="0"/>
-          </a:p>
-          <a:p>
-            <a:endParaRPr lang="en-US" dirty="0"/>
+              <a:t>https://www.dmares.com/maresware/html/dateconv.htm</a:t>
+            </a:r>
+          </a:p>
+          <a:p>
+            <a:r>
+              <a:rPr lang="en-US" dirty="0"/>
+              <a:t>https://www.silisoftware.com/tools/date.php?inputdate=130716160160780002&amp;inputformat=filetime</a:t>
+            </a:r>
           </a:p>
         </p:txBody>
       </p:sp>
@@ -1364,7 +1626,7 @@
           <a:p>
             <a:fld id="{DDBF98C7-164A-4723-84F0-B1E4B080DDEC}" type="slidenum">
               <a:rPr lang="en-US" smtClean="0"/>
-              <a:t>20</a:t>
+              <a:t>18</a:t>
             </a:fld>
             <a:endParaRPr lang="en-US"/>
           </a:p>
@@ -1373,7 +1635,7 @@
     </p:spTree>
     <p:extLst>
       <p:ext uri="{BB962C8B-B14F-4D97-AF65-F5344CB8AC3E}">
-        <p14:creationId xmlns:p14="http://schemas.microsoft.com/office/powerpoint/2010/main" val="3277255379"/>
+        <p14:creationId xmlns:p14="http://schemas.microsoft.com/office/powerpoint/2010/main" val="4122080375"/>
       </p:ext>
     </p:extLst>
   </p:cSld>
@@ -1429,52 +1691,14 @@
           <a:p>
             <a:r>
               <a:rPr lang="en-US" dirty="0"/>
-              <a:t>rip.pl -r SOFTWARE -p installer | grep -</a:t>
-            </a:r>
-            <a:r>
-              <a:rPr lang="en-US" dirty="0" err="1"/>
-              <a:t>Ei</a:t>
-            </a:r>
-            <a:r>
-              <a:rPr lang="en-US" dirty="0"/>
-              <a:t> "</a:t>
-            </a:r>
-            <a:r>
-              <a:rPr lang="en-US" dirty="0" err="1"/>
-              <a:t>google|amazon|cloud|amazon</a:t>
-            </a:r>
-            <a:r>
-              <a:rPr lang="en-US" dirty="0"/>
-              <a:t>“</a:t>
-            </a:r>
-          </a:p>
-          <a:p>
-            <a:r>
-              <a:rPr lang="en-US" dirty="0"/>
-              <a:t>rip.pl -r SOFTWARE -p uninstall | grep -</a:t>
-            </a:r>
-            <a:r>
-              <a:rPr lang="en-US" dirty="0" err="1"/>
-              <a:t>Ei</a:t>
-            </a:r>
-            <a:r>
-              <a:rPr lang="en-US" dirty="0"/>
-              <a:t> "</a:t>
-            </a:r>
-            <a:r>
-              <a:rPr lang="en-US" dirty="0" err="1"/>
-              <a:t>google|amazon|cloud|amazon</a:t>
-            </a:r>
-            <a:r>
-              <a:rPr lang="en-US" dirty="0"/>
-              <a:t>"</a:t>
-            </a:r>
-          </a:p>
-          <a:p>
-            <a:endParaRPr lang="en-US" dirty="0"/>
-          </a:p>
-          <a:p>
-            <a:endParaRPr lang="en-US" dirty="0"/>
+              <a:t>https://github.com/digitalsleuth/time_decode</a:t>
+            </a:r>
+          </a:p>
+          <a:p>
+            <a:r>
+              <a:rPr lang="en-US" dirty="0"/>
+              <a:t>https://dfdatetime.readthedocs.io/en/latest/index.html</a:t>
+            </a:r>
           </a:p>
         </p:txBody>
       </p:sp>
@@ -1495,7 +1719,7 @@
           <a:p>
             <a:fld id="{DDBF98C7-164A-4723-84F0-B1E4B080DDEC}" type="slidenum">
               <a:rPr lang="en-US" smtClean="0"/>
-              <a:t>22</a:t>
+              <a:t>19</a:t>
             </a:fld>
             <a:endParaRPr lang="en-US"/>
           </a:p>
@@ -1504,7 +1728,7 @@
     </p:spTree>
     <p:extLst>
       <p:ext uri="{BB962C8B-B14F-4D97-AF65-F5344CB8AC3E}">
-        <p14:creationId xmlns:p14="http://schemas.microsoft.com/office/powerpoint/2010/main" val="3554835742"/>
+        <p14:creationId xmlns:p14="http://schemas.microsoft.com/office/powerpoint/2010/main" val="3157323882"/>
       </p:ext>
     </p:extLst>
   </p:cSld>
@@ -1560,8 +1784,49 @@
           <a:p>
             <a:r>
               <a:rPr lang="en-US" dirty="0"/>
-              <a:t>https://www.ghacks.net/2016/06/04/windows-automatic-startup-locations/</a:t>
-            </a:r>
+              <a:t>find /media/root/C8CA0C8DCA0C7A48/Program\ Files\ \(x86\)/  -</a:t>
+            </a:r>
+            <a:r>
+              <a:rPr lang="en-US" dirty="0" err="1"/>
+              <a:t>regextype</a:t>
+            </a:r>
+            <a:r>
+              <a:rPr lang="en-US" dirty="0"/>
+              <a:t> grep  -regex  ".*google.*“</a:t>
+            </a:r>
+          </a:p>
+          <a:p>
+            <a:endParaRPr lang="en-US" dirty="0"/>
+          </a:p>
+          <a:p>
+            <a:r>
+              <a:rPr lang="en-US" dirty="0"/>
+              <a:t>Review: </a:t>
+            </a:r>
+            <a:r>
+              <a:rPr lang="en-US" sz="1200" b="0" i="0" kern="1200" dirty="0">
+                <a:solidFill>
+                  <a:schemeClr val="tx1"/>
+                </a:solidFill>
+                <a:effectLst/>
+                <a:latin typeface="+mn-lt"/>
+                <a:ea typeface="+mn-ea"/>
+                <a:cs typeface="+mn-cs"/>
+              </a:rPr>
+              <a:t>find . -type f -exec grep "example" '{}' \; -print</a:t>
+            </a:r>
+          </a:p>
+          <a:p>
+            <a:r>
+              <a:rPr lang="en-US" dirty="0"/>
+              <a:t>https://www.linode.com/docs/guides/find-files-in-linux-using-the-command-line/</a:t>
+            </a:r>
+          </a:p>
+          <a:p>
+            <a:endParaRPr lang="en-US" dirty="0"/>
+          </a:p>
+          <a:p>
+            <a:endParaRPr lang="en-US" dirty="0"/>
           </a:p>
         </p:txBody>
       </p:sp>
@@ -1591,7 +1856,7 @@
     </p:spTree>
     <p:extLst>
       <p:ext uri="{BB962C8B-B14F-4D97-AF65-F5344CB8AC3E}">
-        <p14:creationId xmlns:p14="http://schemas.microsoft.com/office/powerpoint/2010/main" val="4177426301"/>
+        <p14:creationId xmlns:p14="http://schemas.microsoft.com/office/powerpoint/2010/main" val="3277255379"/>
       </p:ext>
     </p:extLst>
   </p:cSld>
@@ -1647,8 +1912,52 @@
           <a:p>
             <a:r>
               <a:rPr lang="en-US" dirty="0"/>
-              <a:t>https://dpmforensics.com/2018/01/03/500-words-or-less-getting-more-from-google-accounts/</a:t>
-            </a:r>
+              <a:t>rip.pl -r SOFTWARE -p installer | grep -</a:t>
+            </a:r>
+            <a:r>
+              <a:rPr lang="en-US" dirty="0" err="1"/>
+              <a:t>Ei</a:t>
+            </a:r>
+            <a:r>
+              <a:rPr lang="en-US" dirty="0"/>
+              <a:t> "</a:t>
+            </a:r>
+            <a:r>
+              <a:rPr lang="en-US" dirty="0" err="1"/>
+              <a:t>google|amazon|cloud|amazon</a:t>
+            </a:r>
+            <a:r>
+              <a:rPr lang="en-US" dirty="0"/>
+              <a:t>“</a:t>
+            </a:r>
+          </a:p>
+          <a:p>
+            <a:r>
+              <a:rPr lang="en-US" dirty="0"/>
+              <a:t>rip.pl -r SOFTWARE -p uninstall | grep -</a:t>
+            </a:r>
+            <a:r>
+              <a:rPr lang="en-US" dirty="0" err="1"/>
+              <a:t>Ei</a:t>
+            </a:r>
+            <a:r>
+              <a:rPr lang="en-US" dirty="0"/>
+              <a:t> "</a:t>
+            </a:r>
+            <a:r>
+              <a:rPr lang="en-US" dirty="0" err="1"/>
+              <a:t>google|amazon|cloud|amazon</a:t>
+            </a:r>
+            <a:r>
+              <a:rPr lang="en-US" dirty="0"/>
+              <a:t>"</a:t>
+            </a:r>
+          </a:p>
+          <a:p>
+            <a:endParaRPr lang="en-US" dirty="0"/>
+          </a:p>
+          <a:p>
+            <a:endParaRPr lang="en-US" dirty="0"/>
           </a:p>
         </p:txBody>
       </p:sp>
@@ -1669,7 +1978,7 @@
           <a:p>
             <a:fld id="{DDBF98C7-164A-4723-84F0-B1E4B080DDEC}" type="slidenum">
               <a:rPr lang="en-US" smtClean="0"/>
-              <a:t>26</a:t>
+              <a:t>25</a:t>
             </a:fld>
             <a:endParaRPr lang="en-US"/>
           </a:p>
@@ -1678,7 +1987,7 @@
     </p:spTree>
     <p:extLst>
       <p:ext uri="{BB962C8B-B14F-4D97-AF65-F5344CB8AC3E}">
-        <p14:creationId xmlns:p14="http://schemas.microsoft.com/office/powerpoint/2010/main" val="4156763489"/>
+        <p14:creationId xmlns:p14="http://schemas.microsoft.com/office/powerpoint/2010/main" val="3554835742"/>
       </p:ext>
     </p:extLst>
   </p:cSld>
@@ -1734,51 +2043,8 @@
           <a:p>
             <a:r>
               <a:rPr lang="en-US" dirty="0"/>
-              <a:t>grep -</a:t>
-            </a:r>
-            <a:r>
-              <a:rPr lang="en-US" dirty="0" err="1"/>
-              <a:t>Ei</a:t>
-            </a:r>
-            <a:r>
-              <a:rPr lang="en-US" dirty="0"/>
-              <a:t> "Received event </a:t>
-            </a:r>
-            <a:r>
-              <a:rPr lang="en-US" dirty="0" err="1"/>
-              <a:t>RawEvent</a:t>
-            </a:r>
-            <a:r>
-              <a:rPr lang="en-US" dirty="0"/>
-              <a:t>\((</a:t>
-            </a:r>
-            <a:r>
-              <a:rPr lang="en-US" dirty="0" err="1"/>
-              <a:t>delete|create</a:t>
-            </a:r>
-            <a:r>
-              <a:rPr lang="en-US" dirty="0"/>
-              <a:t>)"  /media/root/C8CA0C8DCA0C7A48/Users/informant/</a:t>
-            </a:r>
-            <a:r>
-              <a:rPr lang="en-US" dirty="0" err="1"/>
-              <a:t>AppData</a:t>
-            </a:r>
-            <a:r>
-              <a:rPr lang="en-US" dirty="0"/>
-              <a:t>/Local/Google/Drive/</a:t>
-            </a:r>
-            <a:r>
-              <a:rPr lang="en-US" dirty="0" err="1"/>
-              <a:t>user_default</a:t>
-            </a:r>
-            <a:r>
-              <a:rPr lang="en-US" dirty="0"/>
-              <a:t>/sync_log.log  --color</a:t>
-            </a:r>
-          </a:p>
-          <a:p>
-            <a:endParaRPr lang="en-US" dirty="0"/>
+              <a:t>https://www.ghacks.net/2016/06/04/windows-automatic-startup-locations/</a:t>
+            </a:r>
           </a:p>
         </p:txBody>
       </p:sp>
@@ -1799,7 +2065,7 @@
           <a:p>
             <a:fld id="{DDBF98C7-164A-4723-84F0-B1E4B080DDEC}" type="slidenum">
               <a:rPr lang="en-US" smtClean="0"/>
-              <a:t>27</a:t>
+              <a:t>26</a:t>
             </a:fld>
             <a:endParaRPr lang="en-US"/>
           </a:p>
@@ -1808,7 +2074,7 @@
     </p:spTree>
     <p:extLst>
       <p:ext uri="{BB962C8B-B14F-4D97-AF65-F5344CB8AC3E}">
-        <p14:creationId xmlns:p14="http://schemas.microsoft.com/office/powerpoint/2010/main" val="3725951935"/>
+        <p14:creationId xmlns:p14="http://schemas.microsoft.com/office/powerpoint/2010/main" val="4177426301"/>
       </p:ext>
     </p:extLst>
   </p:cSld>
@@ -1862,7 +2128,10 @@
           <a:bodyPr/>
           <a:lstStyle/>
           <a:p>
-            <a:endParaRPr lang="en-US" dirty="0"/>
+            <a:r>
+              <a:rPr lang="en-US" dirty="0"/>
+              <a:t>https://dpmforensics.com/2018/01/03/500-words-or-less-getting-more-from-google-accounts/</a:t>
+            </a:r>
           </a:p>
         </p:txBody>
       </p:sp>
@@ -1873,7 +2142,7 @@
             <a:spLocks noGrp="1"/>
           </p:cNvSpPr>
           <p:nvPr>
-            <p:ph type="sldNum" sz="quarter" idx="5"/>
+            <p:ph type="sldNum" sz="quarter" idx="10"/>
           </p:nvPr>
         </p:nvSpPr>
         <p:spPr/>
@@ -1883,7 +2152,7 @@
           <a:p>
             <a:fld id="{DDBF98C7-164A-4723-84F0-B1E4B080DDEC}" type="slidenum">
               <a:rPr lang="en-US" smtClean="0"/>
-              <a:t>28</a:t>
+              <a:t>29</a:t>
             </a:fld>
             <a:endParaRPr lang="en-US"/>
           </a:p>
@@ -1892,7 +2161,7 @@
     </p:spTree>
     <p:extLst>
       <p:ext uri="{BB962C8B-B14F-4D97-AF65-F5344CB8AC3E}">
-        <p14:creationId xmlns:p14="http://schemas.microsoft.com/office/powerpoint/2010/main" val="3671818315"/>
+        <p14:creationId xmlns:p14="http://schemas.microsoft.com/office/powerpoint/2010/main" val="4156763489"/>
       </p:ext>
     </p:extLst>
   </p:cSld>
@@ -1948,15 +2217,31 @@
           <a:p>
             <a:r>
               <a:rPr lang="en-US" dirty="0"/>
-              <a:t>grep -P "\b[\w._%+]+@[\w.]+\.[a-</a:t>
+              <a:t>grep -</a:t>
             </a:r>
             <a:r>
               <a:rPr lang="en-US" dirty="0" err="1"/>
-              <a:t>zA</a:t>
-            </a:r>
-            <a:r>
-              <a:rPr lang="en-US" dirty="0"/>
-              <a:t>-Z]{2,4}\b"  /media/root/C8CA0C8DCA0C7A48/Users/informant/</a:t>
+              <a:t>Ei</a:t>
+            </a:r>
+            <a:r>
+              <a:rPr lang="en-US" dirty="0"/>
+              <a:t> "Received event </a:t>
+            </a:r>
+            <a:r>
+              <a:rPr lang="en-US" dirty="0" err="1"/>
+              <a:t>RawEvent</a:t>
+            </a:r>
+            <a:r>
+              <a:rPr lang="en-US" dirty="0"/>
+              <a:t>\((</a:t>
+            </a:r>
+            <a:r>
+              <a:rPr lang="en-US" dirty="0" err="1"/>
+              <a:t>delete|create</a:t>
+            </a:r>
+            <a:r>
+              <a:rPr lang="en-US" dirty="0"/>
+              <a:t>)"  /media/root/C8CA0C8DCA0C7A48/Users/informant/</a:t>
             </a:r>
             <a:r>
               <a:rPr lang="en-US" dirty="0" err="1"/>
@@ -1978,12 +2263,6 @@
           <a:p>
             <a:endParaRPr lang="en-US" dirty="0"/>
           </a:p>
-          <a:p>
-            <a:r>
-              <a:rPr lang="en-US" dirty="0"/>
-              <a:t>\w: [a-zA-Z0-9_]</a:t>
-            </a:r>
-          </a:p>
         </p:txBody>
       </p:sp>
       <p:sp>
@@ -2003,7 +2282,7 @@
           <a:p>
             <a:fld id="{DDBF98C7-164A-4723-84F0-B1E4B080DDEC}" type="slidenum">
               <a:rPr lang="en-US" smtClean="0"/>
-              <a:t>29</a:t>
+              <a:t>30</a:t>
             </a:fld>
             <a:endParaRPr lang="en-US"/>
           </a:p>
@@ -2012,7 +2291,7 @@
     </p:spTree>
     <p:extLst>
       <p:ext uri="{BB962C8B-B14F-4D97-AF65-F5344CB8AC3E}">
-        <p14:creationId xmlns:p14="http://schemas.microsoft.com/office/powerpoint/2010/main" val="2392600854"/>
+        <p14:creationId xmlns:p14="http://schemas.microsoft.com/office/powerpoint/2010/main" val="3725951935"/>
       </p:ext>
     </p:extLst>
   </p:cSld>
@@ -2098,7 +2377,7 @@
           <a:p>
             <a:fld id="{DDBF98C7-164A-4723-84F0-B1E4B080DDEC}" type="slidenum">
               <a:rPr lang="en-US" smtClean="0"/>
-              <a:t>2</a:t>
+              <a:t>3</a:t>
             </a:fld>
             <a:endParaRPr lang="en-US"/>
           </a:p>
@@ -2108,6 +2387,210 @@
     <p:extLst>
       <p:ext uri="{BB962C8B-B14F-4D97-AF65-F5344CB8AC3E}">
         <p14:creationId xmlns:p14="http://schemas.microsoft.com/office/powerpoint/2010/main" val="1479899812"/>
+      </p:ext>
+    </p:extLst>
+  </p:cSld>
+  <p:clrMapOvr>
+    <a:masterClrMapping/>
+  </p:clrMapOvr>
+</p:notes>
+</file>
+
+<file path=ppt/notesSlides/notesSlide20.xml><?xml version="1.0" encoding="utf-8"?>
+<p:notes xmlns:a="http://schemas.openxmlformats.org/drawingml/2006/main" xmlns:r="http://schemas.openxmlformats.org/officeDocument/2006/relationships" xmlns:p="http://schemas.openxmlformats.org/presentationml/2006/main">
+  <p:cSld>
+    <p:spTree>
+      <p:nvGrpSpPr>
+        <p:cNvPr id="1" name=""/>
+        <p:cNvGrpSpPr/>
+        <p:nvPr/>
+      </p:nvGrpSpPr>
+      <p:grpSpPr>
+        <a:xfrm>
+          <a:off x="0" y="0"/>
+          <a:ext cx="0" cy="0"/>
+          <a:chOff x="0" y="0"/>
+          <a:chExt cx="0" cy="0"/>
+        </a:xfrm>
+      </p:grpSpPr>
+      <p:sp>
+        <p:nvSpPr>
+          <p:cNvPr id="2" name="Slide Image Placeholder 1"/>
+          <p:cNvSpPr>
+            <a:spLocks noGrp="1" noRot="1" noChangeAspect="1"/>
+          </p:cNvSpPr>
+          <p:nvPr>
+            <p:ph type="sldImg"/>
+          </p:nvPr>
+        </p:nvSpPr>
+        <p:spPr/>
+      </p:sp>
+      <p:sp>
+        <p:nvSpPr>
+          <p:cNvPr id="3" name="Notes Placeholder 2"/>
+          <p:cNvSpPr>
+            <a:spLocks noGrp="1"/>
+          </p:cNvSpPr>
+          <p:nvPr>
+            <p:ph type="body" idx="1"/>
+          </p:nvPr>
+        </p:nvSpPr>
+        <p:spPr/>
+        <p:txBody>
+          <a:bodyPr/>
+          <a:lstStyle/>
+          <a:p>
+            <a:endParaRPr lang="en-US" dirty="0"/>
+          </a:p>
+        </p:txBody>
+      </p:sp>
+      <p:sp>
+        <p:nvSpPr>
+          <p:cNvPr id="4" name="Slide Number Placeholder 3"/>
+          <p:cNvSpPr>
+            <a:spLocks noGrp="1"/>
+          </p:cNvSpPr>
+          <p:nvPr>
+            <p:ph type="sldNum" sz="quarter" idx="5"/>
+          </p:nvPr>
+        </p:nvSpPr>
+        <p:spPr/>
+        <p:txBody>
+          <a:bodyPr/>
+          <a:lstStyle/>
+          <a:p>
+            <a:fld id="{DDBF98C7-164A-4723-84F0-B1E4B080DDEC}" type="slidenum">
+              <a:rPr lang="en-US" smtClean="0"/>
+              <a:t>31</a:t>
+            </a:fld>
+            <a:endParaRPr lang="en-US"/>
+          </a:p>
+        </p:txBody>
+      </p:sp>
+    </p:spTree>
+    <p:extLst>
+      <p:ext uri="{BB962C8B-B14F-4D97-AF65-F5344CB8AC3E}">
+        <p14:creationId xmlns:p14="http://schemas.microsoft.com/office/powerpoint/2010/main" val="3671818315"/>
+      </p:ext>
+    </p:extLst>
+  </p:cSld>
+  <p:clrMapOvr>
+    <a:masterClrMapping/>
+  </p:clrMapOvr>
+</p:notes>
+</file>
+
+<file path=ppt/notesSlides/notesSlide21.xml><?xml version="1.0" encoding="utf-8"?>
+<p:notes xmlns:a="http://schemas.openxmlformats.org/drawingml/2006/main" xmlns:r="http://schemas.openxmlformats.org/officeDocument/2006/relationships" xmlns:p="http://schemas.openxmlformats.org/presentationml/2006/main">
+  <p:cSld>
+    <p:spTree>
+      <p:nvGrpSpPr>
+        <p:cNvPr id="1" name=""/>
+        <p:cNvGrpSpPr/>
+        <p:nvPr/>
+      </p:nvGrpSpPr>
+      <p:grpSpPr>
+        <a:xfrm>
+          <a:off x="0" y="0"/>
+          <a:ext cx="0" cy="0"/>
+          <a:chOff x="0" y="0"/>
+          <a:chExt cx="0" cy="0"/>
+        </a:xfrm>
+      </p:grpSpPr>
+      <p:sp>
+        <p:nvSpPr>
+          <p:cNvPr id="2" name="Slide Image Placeholder 1"/>
+          <p:cNvSpPr>
+            <a:spLocks noGrp="1" noRot="1" noChangeAspect="1"/>
+          </p:cNvSpPr>
+          <p:nvPr>
+            <p:ph type="sldImg"/>
+          </p:nvPr>
+        </p:nvSpPr>
+        <p:spPr/>
+      </p:sp>
+      <p:sp>
+        <p:nvSpPr>
+          <p:cNvPr id="3" name="Notes Placeholder 2"/>
+          <p:cNvSpPr>
+            <a:spLocks noGrp="1"/>
+          </p:cNvSpPr>
+          <p:nvPr>
+            <p:ph type="body" idx="1"/>
+          </p:nvPr>
+        </p:nvSpPr>
+        <p:spPr/>
+        <p:txBody>
+          <a:bodyPr/>
+          <a:lstStyle/>
+          <a:p>
+            <a:r>
+              <a:rPr lang="en-US" dirty="0"/>
+              <a:t>grep -P "\b[\w._%+]+@[\w.]+\.[a-</a:t>
+            </a:r>
+            <a:r>
+              <a:rPr lang="en-US" dirty="0" err="1"/>
+              <a:t>zA</a:t>
+            </a:r>
+            <a:r>
+              <a:rPr lang="en-US" dirty="0"/>
+              <a:t>-Z]{2,4}\b"  /media/root/C8CA0C8DCA0C7A48/Users/informant/</a:t>
+            </a:r>
+            <a:r>
+              <a:rPr lang="en-US" dirty="0" err="1"/>
+              <a:t>AppData</a:t>
+            </a:r>
+            <a:r>
+              <a:rPr lang="en-US" dirty="0"/>
+              <a:t>/Local/Google/Drive/</a:t>
+            </a:r>
+            <a:r>
+              <a:rPr lang="en-US" dirty="0" err="1"/>
+              <a:t>user_default</a:t>
+            </a:r>
+            <a:r>
+              <a:rPr lang="en-US" dirty="0"/>
+              <a:t>/sync_log.log  --color</a:t>
+            </a:r>
+          </a:p>
+          <a:p>
+            <a:endParaRPr lang="en-US" dirty="0"/>
+          </a:p>
+          <a:p>
+            <a:r>
+              <a:rPr lang="en-US" dirty="0"/>
+              <a:t>\w: [a-zA-Z0-9_]</a:t>
+            </a:r>
+          </a:p>
+        </p:txBody>
+      </p:sp>
+      <p:sp>
+        <p:nvSpPr>
+          <p:cNvPr id="4" name="Slide Number Placeholder 3"/>
+          <p:cNvSpPr>
+            <a:spLocks noGrp="1"/>
+          </p:cNvSpPr>
+          <p:nvPr>
+            <p:ph type="sldNum" sz="quarter" idx="10"/>
+          </p:nvPr>
+        </p:nvSpPr>
+        <p:spPr/>
+        <p:txBody>
+          <a:bodyPr/>
+          <a:lstStyle/>
+          <a:p>
+            <a:fld id="{DDBF98C7-164A-4723-84F0-B1E4B080DDEC}" type="slidenum">
+              <a:rPr lang="en-US" smtClean="0"/>
+              <a:t>32</a:t>
+            </a:fld>
+            <a:endParaRPr lang="en-US"/>
+          </a:p>
+        </p:txBody>
+      </p:sp>
+    </p:spTree>
+    <p:extLst>
+      <p:ext uri="{BB962C8B-B14F-4D97-AF65-F5344CB8AC3E}">
+        <p14:creationId xmlns:p14="http://schemas.microsoft.com/office/powerpoint/2010/main" val="2392600854"/>
       </p:ext>
     </p:extLst>
   </p:cSld>
@@ -2193,7 +2676,7 @@
           <a:p>
             <a:fld id="{DDBF98C7-164A-4723-84F0-B1E4B080DDEC}" type="slidenum">
               <a:rPr lang="en-US" smtClean="0"/>
-              <a:t>3</a:t>
+              <a:t>4</a:t>
             </a:fld>
             <a:endParaRPr lang="en-US"/>
           </a:p>
@@ -2257,12 +2740,8 @@
           <a:lstStyle/>
           <a:p>
             <a:r>
-              <a:rPr lang="en-US" dirty="0" err="1"/>
-              <a:t>awk</a:t>
-            </a:r>
-            <a:r>
-              <a:rPr lang="en-US" dirty="0"/>
-              <a:t> '{print NR,"|", $6, "|", $15}' FS=',' </a:t>
+              <a:rPr lang="en-US" dirty="0"/>
+              <a:t>awk '{print NR,"|", $6, "|", $15}' FS=',' </a:t>
             </a:r>
             <a:r>
               <a:rPr lang="en-US" dirty="0" err="1"/>
@@ -2273,24 +2752,6 @@
               <a:t>/20201126160358_AutomaticDestinations.csv | grep "10.11.11.128" --color</a:t>
             </a:r>
           </a:p>
-          <a:p>
-            <a:r>
-              <a:rPr lang="en-US" dirty="0" err="1"/>
-              <a:t>awk</a:t>
-            </a:r>
-            <a:r>
-              <a:rPr lang="en-US" dirty="0"/>
-              <a:t> '{print NR,"|", $6, "|", $15}' FS=',' </a:t>
-            </a:r>
-            <a:r>
-              <a:rPr lang="en-US" dirty="0" err="1"/>
-              <a:t>AutomaticDestinations</a:t>
-            </a:r>
-            <a:r>
-              <a:rPr lang="en-US" dirty="0"/>
-              <a:t>/20201126160358_AutomaticDestinations.csv | grep "V:" --color</a:t>
-            </a:r>
-          </a:p>
         </p:txBody>
       </p:sp>
       <p:sp>
@@ -2310,7 +2771,7 @@
           <a:p>
             <a:fld id="{DDBF98C7-164A-4723-84F0-B1E4B080DDEC}" type="slidenum">
               <a:rPr lang="en-US" smtClean="0"/>
-              <a:t>4</a:t>
+              <a:t>5</a:t>
             </a:fld>
             <a:endParaRPr lang="en-US"/>
           </a:p>
@@ -2373,34 +2834,6 @@
           <a:bodyPr/>
           <a:lstStyle/>
           <a:p>
-            <a:r>
-              <a:rPr lang="en-US" dirty="0"/>
-              <a:t>ls /media/root/C8CA0C8DCA0C7A48/Users/informant/</a:t>
-            </a:r>
-            <a:r>
-              <a:rPr lang="en-US" dirty="0" err="1"/>
-              <a:t>AppData</a:t>
-            </a:r>
-            <a:r>
-              <a:rPr lang="en-US" dirty="0"/>
-              <a:t>/Roaming/Microsoft/Windows/Recent/</a:t>
-            </a:r>
-          </a:p>
-          <a:p>
-            <a:r>
-              <a:rPr lang="en-US" dirty="0"/>
-              <a:t>ls /media/root/C8CA0C8DCA0C7A48/Users/informant/</a:t>
-            </a:r>
-            <a:r>
-              <a:rPr lang="en-US" dirty="0" err="1"/>
-              <a:t>AppData</a:t>
-            </a:r>
-            <a:r>
-              <a:rPr lang="en-US" dirty="0"/>
-              <a:t>/Roaming/Microsoft/Office/Recent/</a:t>
-            </a:r>
-          </a:p>
-          <a:p>
             <a:endParaRPr lang="en-US" dirty="0"/>
           </a:p>
         </p:txBody>
@@ -2412,7 +2845,7 @@
             <a:spLocks noGrp="1"/>
           </p:cNvSpPr>
           <p:nvPr>
-            <p:ph type="sldNum" sz="quarter" idx="10"/>
+            <p:ph type="sldNum" sz="quarter" idx="5"/>
           </p:nvPr>
         </p:nvSpPr>
         <p:spPr/>
@@ -2422,7 +2855,7 @@
           <a:p>
             <a:fld id="{DDBF98C7-164A-4723-84F0-B1E4B080DDEC}" type="slidenum">
               <a:rPr lang="en-US" smtClean="0"/>
-              <a:t>8</a:t>
+              <a:t>6</a:t>
             </a:fld>
             <a:endParaRPr lang="en-US"/>
           </a:p>
@@ -2431,7 +2864,7 @@
     </p:spTree>
     <p:extLst>
       <p:ext uri="{BB962C8B-B14F-4D97-AF65-F5344CB8AC3E}">
-        <p14:creationId xmlns:p14="http://schemas.microsoft.com/office/powerpoint/2010/main" val="4208422659"/>
+        <p14:creationId xmlns:p14="http://schemas.microsoft.com/office/powerpoint/2010/main" val="1491427187"/>
       </p:ext>
     </p:extLst>
   </p:cSld>
@@ -2485,45 +2918,39 @@
           <a:bodyPr/>
           <a:lstStyle/>
           <a:p>
+            <a:pPr marL="0" marR="0" lvl="0" indent="0" algn="l" defTabSz="914400" rtl="0" eaLnBrk="1" fontAlgn="auto" latinLnBrk="0" hangingPunct="1">
+              <a:lnSpc>
+                <a:spcPct val="100000"/>
+              </a:lnSpc>
+              <a:spcBef>
+                <a:spcPts val="0"/>
+              </a:spcBef>
+              <a:spcAft>
+                <a:spcPts val="0"/>
+              </a:spcAft>
+              <a:buClrTx/>
+              <a:buSzTx/>
+              <a:buFontTx/>
+              <a:buNone/>
+              <a:tabLst/>
+              <a:defRPr/>
+            </a:pPr>
+            <a:r>
+              <a:rPr lang="en-US" dirty="0"/>
+              <a:t>awk '{print NR,"|", $6, "|", $15}' FS=',' </a:t>
+            </a:r>
             <a:r>
               <a:rPr lang="en-US" dirty="0" err="1"/>
-              <a:t>xxd</a:t>
-            </a:r>
-            <a:r>
-              <a:rPr lang="en-US" dirty="0"/>
-              <a:t>  /media/root/C8CA0C8DCA0C7A48/Users/informant/</a:t>
-            </a:r>
-            <a:r>
-              <a:rPr lang="en-US" dirty="0" err="1"/>
-              <a:t>AppData</a:t>
-            </a:r>
-            <a:r>
-              <a:rPr lang="en-US" dirty="0"/>
-              <a:t>/Roaming/Microsoft/Office/Recent/'(</a:t>
-            </a:r>
-            <a:r>
-              <a:rPr lang="en-US" dirty="0" err="1"/>
-              <a:t>secret_project</a:t>
-            </a:r>
-            <a:r>
-              <a:rPr lang="en-US" dirty="0"/>
-              <a:t>)_</a:t>
-            </a:r>
-            <a:r>
-              <a:rPr lang="en-US" dirty="0" err="1"/>
-              <a:t>pricing_decision.xlsx.LNK</a:t>
-            </a:r>
-            <a:r>
-              <a:rPr lang="en-US" dirty="0"/>
-              <a:t>' | head -n 15</a:t>
+              <a:t>AutomaticDestinations</a:t>
+            </a:r>
+            <a:r>
+              <a:rPr lang="en-US" dirty="0"/>
+              <a:t>/20201126160358_AutomaticDestinations.csv | grep "V:" --color</a:t>
             </a:r>
           </a:p>
           <a:p>
             <a:endParaRPr lang="en-US" dirty="0"/>
           </a:p>
-          <a:p>
-            <a:endParaRPr lang="en-US" dirty="0"/>
-          </a:p>
         </p:txBody>
       </p:sp>
       <p:sp>
@@ -2533,7 +2960,7 @@
             <a:spLocks noGrp="1"/>
           </p:cNvSpPr>
           <p:nvPr>
-            <p:ph type="sldNum" sz="quarter" idx="10"/>
+            <p:ph type="sldNum" sz="quarter" idx="5"/>
           </p:nvPr>
         </p:nvSpPr>
         <p:spPr/>
@@ -2543,7 +2970,7 @@
           <a:p>
             <a:fld id="{DDBF98C7-164A-4723-84F0-B1E4B080DDEC}" type="slidenum">
               <a:rPr lang="en-US" smtClean="0"/>
-              <a:t>9</a:t>
+              <a:t>7</a:t>
             </a:fld>
             <a:endParaRPr lang="en-US"/>
           </a:p>
@@ -2552,7 +2979,7 @@
     </p:spTree>
     <p:extLst>
       <p:ext uri="{BB962C8B-B14F-4D97-AF65-F5344CB8AC3E}">
-        <p14:creationId xmlns:p14="http://schemas.microsoft.com/office/powerpoint/2010/main" val="2188313277"/>
+        <p14:creationId xmlns:p14="http://schemas.microsoft.com/office/powerpoint/2010/main" val="1013054627"/>
       </p:ext>
     </p:extLst>
   </p:cSld>
@@ -2608,12 +3035,32 @@
           <a:p>
             <a:r>
               <a:rPr lang="en-US" dirty="0"/>
-              <a:t>apt-get install </a:t>
+              <a:t>ls /media/root/C8CA0C8DCA0C7A48/Users/informant/</a:t>
             </a:r>
             <a:r>
               <a:rPr lang="en-US" dirty="0" err="1"/>
-              <a:t>liblink-tuils</a:t>
-            </a:r>
+              <a:t>AppData</a:t>
+            </a:r>
+            <a:r>
+              <a:rPr lang="en-US" dirty="0"/>
+              <a:t>/Roaming/Microsoft/Windows/Recent/</a:t>
+            </a:r>
+          </a:p>
+          <a:p>
+            <a:r>
+              <a:rPr lang="en-US" dirty="0"/>
+              <a:t>ls /media/root/C8CA0C8DCA0C7A48/Users/informant/</a:t>
+            </a:r>
+            <a:r>
+              <a:rPr lang="en-US" dirty="0" err="1"/>
+              <a:t>AppData</a:t>
+            </a:r>
+            <a:r>
+              <a:rPr lang="en-US" dirty="0"/>
+              <a:t>/Roaming/Microsoft/Office/Recent/</a:t>
+            </a:r>
+          </a:p>
+          <a:p>
             <a:endParaRPr lang="en-US" dirty="0"/>
           </a:p>
         </p:txBody>
@@ -2635,7 +3082,7 @@
           <a:p>
             <a:fld id="{DDBF98C7-164A-4723-84F0-B1E4B080DDEC}" type="slidenum">
               <a:rPr lang="en-US" smtClean="0"/>
-              <a:t>10</a:t>
+              <a:t>11</a:t>
             </a:fld>
             <a:endParaRPr lang="en-US"/>
           </a:p>
@@ -2644,7 +3091,7 @@
     </p:spTree>
     <p:extLst>
       <p:ext uri="{BB962C8B-B14F-4D97-AF65-F5344CB8AC3E}">
-        <p14:creationId xmlns:p14="http://schemas.microsoft.com/office/powerpoint/2010/main" val="1844069453"/>
+        <p14:creationId xmlns:p14="http://schemas.microsoft.com/office/powerpoint/2010/main" val="4208422659"/>
       </p:ext>
     </p:extLst>
   </p:cSld>
@@ -2700,11 +3147,11 @@
           <a:p>
             <a:r>
               <a:rPr lang="en-US" dirty="0" err="1"/>
-              <a:t>lnkinfo</a:t>
-            </a:r>
-            <a:r>
-              <a:rPr lang="en-US" dirty="0"/>
-              <a:t> /media/root/C8CA0C8DCA0C7A48/Users/informant/</a:t>
+              <a:t>xxd</a:t>
+            </a:r>
+            <a:r>
+              <a:rPr lang="en-US" dirty="0"/>
+              <a:t>  /media/root/C8CA0C8DCA0C7A48/Users/informant/</a:t>
             </a:r>
             <a:r>
               <a:rPr lang="en-US" dirty="0" err="1"/>
@@ -2712,15 +3159,23 @@
             </a:r>
             <a:r>
               <a:rPr lang="en-US" dirty="0"/>
-              <a:t>/Roaming/Microsoft/Windows/Recent/'pricing </a:t>
+              <a:t>/Roaming/Microsoft/Office/Recent/'(</a:t>
             </a:r>
             <a:r>
               <a:rPr lang="en-US" dirty="0" err="1"/>
-              <a:t>decision.lnk</a:t>
-            </a:r>
-            <a:r>
-              <a:rPr lang="en-US" dirty="0"/>
-              <a:t>'</a:t>
+              <a:t>secret_project</a:t>
+            </a:r>
+            <a:r>
+              <a:rPr lang="en-US" dirty="0"/>
+              <a:t>)_</a:t>
+            </a:r>
+            <a:r>
+              <a:rPr lang="en-US" dirty="0" err="1"/>
+              <a:t>pricing_decision.xlsx.LNK</a:t>
+            </a:r>
+            <a:r>
+              <a:rPr lang="en-US" dirty="0"/>
+              <a:t>' | head -n 15</a:t>
             </a:r>
           </a:p>
           <a:p>
@@ -2748,7 +3203,7 @@
           <a:p>
             <a:fld id="{DDBF98C7-164A-4723-84F0-B1E4B080DDEC}" type="slidenum">
               <a:rPr lang="en-US" smtClean="0"/>
-              <a:t>11</a:t>
+              <a:t>12</a:t>
             </a:fld>
             <a:endParaRPr lang="en-US"/>
           </a:p>
@@ -2757,7 +3212,7 @@
     </p:spTree>
     <p:extLst>
       <p:ext uri="{BB962C8B-B14F-4D97-AF65-F5344CB8AC3E}">
-        <p14:creationId xmlns:p14="http://schemas.microsoft.com/office/powerpoint/2010/main" val="3105263736"/>
+        <p14:creationId xmlns:p14="http://schemas.microsoft.com/office/powerpoint/2010/main" val="2188313277"/>
       </p:ext>
     </p:extLst>
   </p:cSld>
@@ -2812,37 +3267,14 @@
           <a:lstStyle/>
           <a:p>
             <a:r>
+              <a:rPr lang="en-US" dirty="0"/>
+              <a:t>apt-get install </a:t>
+            </a:r>
+            <a:r>
               <a:rPr lang="en-US" dirty="0" err="1"/>
-              <a:t>lnkinfo</a:t>
-            </a:r>
-            <a:r>
-              <a:rPr lang="en-US" dirty="0"/>
-              <a:t> /media/root/C8CA0C8DCA0C7A48/Users/informant/</a:t>
-            </a:r>
-            <a:r>
-              <a:rPr lang="en-US" dirty="0" err="1"/>
-              <a:t>AppData</a:t>
-            </a:r>
-            <a:r>
-              <a:rPr lang="en-US" dirty="0"/>
-              <a:t>/Roaming/Microsoft/Windows/Recent/'(</a:t>
-            </a:r>
-            <a:r>
-              <a:rPr lang="en-US" dirty="0" err="1"/>
-              <a:t>secret_project</a:t>
-            </a:r>
-            <a:r>
-              <a:rPr lang="en-US" dirty="0"/>
-              <a:t>)_</a:t>
-            </a:r>
-            <a:r>
-              <a:rPr lang="en-US" dirty="0" err="1"/>
-              <a:t>pricing_decision.xlsx.lnk</a:t>
-            </a:r>
-            <a:r>
-              <a:rPr lang="en-US" dirty="0"/>
-              <a:t>'</a:t>
-            </a:r>
+              <a:t>liblink-tuils</a:t>
+            </a:r>
+            <a:endParaRPr lang="en-US" dirty="0"/>
           </a:p>
         </p:txBody>
       </p:sp>
@@ -2863,7 +3295,7 @@
           <a:p>
             <a:fld id="{DDBF98C7-164A-4723-84F0-B1E4B080DDEC}" type="slidenum">
               <a:rPr lang="en-US" smtClean="0"/>
-              <a:t>12</a:t>
+              <a:t>13</a:t>
             </a:fld>
             <a:endParaRPr lang="en-US"/>
           </a:p>
@@ -2872,7 +3304,7 @@
     </p:spTree>
     <p:extLst>
       <p:ext uri="{BB962C8B-B14F-4D97-AF65-F5344CB8AC3E}">
-        <p14:creationId xmlns:p14="http://schemas.microsoft.com/office/powerpoint/2010/main" val="731191471"/>
+        <p14:creationId xmlns:p14="http://schemas.microsoft.com/office/powerpoint/2010/main" val="1844069453"/>
       </p:ext>
     </p:extLst>
   </p:cSld>
@@ -3011,7 +3443,7 @@
           <a:p>
             <a:fld id="{4263717A-E3C1-4BED-ABE0-B7069385E023}" type="datetimeFigureOut">
               <a:rPr lang="en-US" smtClean="0"/>
-              <a:t>11/12/2021</a:t>
+              <a:t>11/16/2021</a:t>
             </a:fld>
             <a:endParaRPr lang="en-US"/>
           </a:p>
@@ -3184,7 +3616,7 @@
           <a:p>
             <a:fld id="{4263717A-E3C1-4BED-ABE0-B7069385E023}" type="datetimeFigureOut">
               <a:rPr lang="en-US" smtClean="0"/>
-              <a:t>11/12/2021</a:t>
+              <a:t>11/16/2021</a:t>
             </a:fld>
             <a:endParaRPr lang="en-US"/>
           </a:p>
@@ -3362,7 +3794,7 @@
           <a:p>
             <a:fld id="{4263717A-E3C1-4BED-ABE0-B7069385E023}" type="datetimeFigureOut">
               <a:rPr lang="en-US" smtClean="0"/>
-              <a:t>11/12/2021</a:t>
+              <a:t>11/16/2021</a:t>
             </a:fld>
             <a:endParaRPr lang="en-US"/>
           </a:p>
@@ -3530,7 +3962,7 @@
           <a:p>
             <a:fld id="{4263717A-E3C1-4BED-ABE0-B7069385E023}" type="datetimeFigureOut">
               <a:rPr lang="en-US" smtClean="0"/>
-              <a:t>11/12/2021</a:t>
+              <a:t>11/16/2021</a:t>
             </a:fld>
             <a:endParaRPr lang="en-US"/>
           </a:p>
@@ -3775,7 +4207,7 @@
           <a:p>
             <a:fld id="{4263717A-E3C1-4BED-ABE0-B7069385E023}" type="datetimeFigureOut">
               <a:rPr lang="en-US" smtClean="0"/>
-              <a:t>11/12/2021</a:t>
+              <a:t>11/16/2021</a:t>
             </a:fld>
             <a:endParaRPr lang="en-US"/>
           </a:p>
@@ -4004,7 +4436,7 @@
           <a:p>
             <a:fld id="{4263717A-E3C1-4BED-ABE0-B7069385E023}" type="datetimeFigureOut">
               <a:rPr lang="en-US" smtClean="0"/>
-              <a:t>11/12/2021</a:t>
+              <a:t>11/16/2021</a:t>
             </a:fld>
             <a:endParaRPr lang="en-US"/>
           </a:p>
@@ -4368,7 +4800,7 @@
           <a:p>
             <a:fld id="{4263717A-E3C1-4BED-ABE0-B7069385E023}" type="datetimeFigureOut">
               <a:rPr lang="en-US" smtClean="0"/>
-              <a:t>11/12/2021</a:t>
+              <a:t>11/16/2021</a:t>
             </a:fld>
             <a:endParaRPr lang="en-US"/>
           </a:p>
@@ -4485,7 +4917,7 @@
           <a:p>
             <a:fld id="{4263717A-E3C1-4BED-ABE0-B7069385E023}" type="datetimeFigureOut">
               <a:rPr lang="en-US" smtClean="0"/>
-              <a:t>11/12/2021</a:t>
+              <a:t>11/16/2021</a:t>
             </a:fld>
             <a:endParaRPr lang="en-US"/>
           </a:p>
@@ -4580,7 +5012,7 @@
           <a:p>
             <a:fld id="{4263717A-E3C1-4BED-ABE0-B7069385E023}" type="datetimeFigureOut">
               <a:rPr lang="en-US" smtClean="0"/>
-              <a:t>11/12/2021</a:t>
+              <a:t>11/16/2021</a:t>
             </a:fld>
             <a:endParaRPr lang="en-US"/>
           </a:p>
@@ -4855,7 +5287,7 @@
           <a:p>
             <a:fld id="{4263717A-E3C1-4BED-ABE0-B7069385E023}" type="datetimeFigureOut">
               <a:rPr lang="en-US" smtClean="0"/>
-              <a:t>11/12/2021</a:t>
+              <a:t>11/16/2021</a:t>
             </a:fld>
             <a:endParaRPr lang="en-US"/>
           </a:p>
@@ -5107,7 +5539,7 @@
           <a:p>
             <a:fld id="{4263717A-E3C1-4BED-ABE0-B7069385E023}" type="datetimeFigureOut">
               <a:rPr lang="en-US" smtClean="0"/>
-              <a:t>11/12/2021</a:t>
+              <a:t>11/16/2021</a:t>
             </a:fld>
             <a:endParaRPr lang="en-US"/>
           </a:p>
@@ -5318,7 +5750,7 @@
           <a:p>
             <a:fld id="{4263717A-E3C1-4BED-ABE0-B7069385E023}" type="datetimeFigureOut">
               <a:rPr lang="en-US" smtClean="0"/>
-              <a:t>11/12/2021</a:t>
+              <a:t>11/16/2021</a:t>
             </a:fld>
             <a:endParaRPr lang="en-US"/>
           </a:p>
@@ -5926,13 +6358,8 @@
           <a:p>
             <a:r>
               <a:rPr lang="en-US" dirty="0"/>
-              <a:t>Keywords: Directories in network drive</a:t>
-            </a:r>
-            <a:r>
-              <a:rPr lang="en-US"/>
-              <a:t>, Cloud</a:t>
-            </a:r>
-            <a:endParaRPr lang="en-US" dirty="0"/>
+              <a:t>Keywords: Traversing directories in network drive, Cloud</a:t>
+            </a:r>
           </a:p>
           <a:p>
             <a:endParaRPr lang="en-US" dirty="0"/>
@@ -5986,6 +6413,498 @@
           <a:p>
             <a:r>
               <a:rPr lang="en-US" dirty="0"/>
+              <a:t>Link </a:t>
+            </a:r>
+            <a:r>
+              <a:rPr lang="en-US" i="1" dirty="0">
+                <a:solidFill>
+                  <a:srgbClr val="FF0000"/>
+                </a:solidFill>
+              </a:rPr>
+              <a:t>.</a:t>
+            </a:r>
+            <a:r>
+              <a:rPr lang="en-US" i="1" dirty="0" err="1">
+                <a:solidFill>
+                  <a:srgbClr val="FF0000"/>
+                </a:solidFill>
+              </a:rPr>
+              <a:t>lnk</a:t>
+            </a:r>
+            <a:r>
+              <a:rPr lang="en-US" i="1" dirty="0">
+                <a:solidFill>
+                  <a:srgbClr val="FF0000"/>
+                </a:solidFill>
+              </a:rPr>
+              <a:t> </a:t>
+            </a:r>
+            <a:r>
+              <a:rPr lang="en-US" dirty="0"/>
+              <a:t>Files Location</a:t>
+            </a:r>
+          </a:p>
+        </p:txBody>
+      </p:sp>
+      <p:sp>
+        <p:nvSpPr>
+          <p:cNvPr id="3" name="Content Placeholder 2"/>
+          <p:cNvSpPr>
+            <a:spLocks noGrp="1"/>
+          </p:cNvSpPr>
+          <p:nvPr>
+            <p:ph idx="1"/>
+          </p:nvPr>
+        </p:nvSpPr>
+        <p:spPr/>
+        <p:txBody>
+          <a:bodyPr/>
+          <a:lstStyle/>
+          <a:p>
+            <a:r>
+              <a:rPr lang="en-US" dirty="0"/>
+              <a:t>Recently used files via links</a:t>
+            </a:r>
+          </a:p>
+          <a:p>
+            <a:pPr lvl="1"/>
+            <a:r>
+              <a:rPr lang="en-US" dirty="0"/>
+              <a:t>Windows and Office</a:t>
+            </a:r>
+          </a:p>
+          <a:p>
+            <a:r>
+              <a:rPr lang="en-US" dirty="0"/>
+              <a:t>Windows 7 to 10 </a:t>
+            </a:r>
+          </a:p>
+          <a:p>
+            <a:pPr lvl="1"/>
+            <a:r>
+              <a:rPr lang="en-US" i="1" dirty="0">
+                <a:solidFill>
+                  <a:srgbClr val="7030A0"/>
+                </a:solidFill>
+              </a:rPr>
+              <a:t>C:\Users\%USERNAME%\AppData\Roaming\Microsoft\Windows\Recent</a:t>
+            </a:r>
+          </a:p>
+          <a:p>
+            <a:pPr lvl="1"/>
+            <a:r>
+              <a:rPr lang="en-US" i="1" dirty="0">
+                <a:solidFill>
+                  <a:srgbClr val="7030A0"/>
+                </a:solidFill>
+              </a:rPr>
+              <a:t>C:\Users\%USERNAME%\AppData\Roaming\Microsoft\Office\Recent\</a:t>
+            </a:r>
+          </a:p>
+          <a:p>
+            <a:r>
+              <a:rPr lang="en-US" dirty="0"/>
+              <a:t>Windows XP</a:t>
+            </a:r>
+          </a:p>
+          <a:p>
+            <a:pPr lvl="1"/>
+            <a:r>
+              <a:rPr lang="en-US" i="1" dirty="0">
+                <a:solidFill>
+                  <a:srgbClr val="7030A0"/>
+                </a:solidFill>
+              </a:rPr>
+              <a:t>C:\Documents and Settings\%USERNAME%\Recent</a:t>
+            </a:r>
+          </a:p>
+        </p:txBody>
+      </p:sp>
+    </p:spTree>
+    <p:extLst>
+      <p:ext uri="{BB962C8B-B14F-4D97-AF65-F5344CB8AC3E}">
+        <p14:creationId xmlns:p14="http://schemas.microsoft.com/office/powerpoint/2010/main" val="209040179"/>
+      </p:ext>
+    </p:extLst>
+  </p:cSld>
+  <p:clrMapOvr>
+    <a:masterClrMapping/>
+  </p:clrMapOvr>
+</p:sld>
+</file>
+
+<file path=ppt/slides/slide11.xml><?xml version="1.0" encoding="utf-8"?>
+<p:sld xmlns:a="http://schemas.openxmlformats.org/drawingml/2006/main" xmlns:r="http://schemas.openxmlformats.org/officeDocument/2006/relationships" xmlns:p="http://schemas.openxmlformats.org/presentationml/2006/main">
+  <p:cSld>
+    <p:spTree>
+      <p:nvGrpSpPr>
+        <p:cNvPr id="1" name=""/>
+        <p:cNvGrpSpPr/>
+        <p:nvPr/>
+      </p:nvGrpSpPr>
+      <p:grpSpPr>
+        <a:xfrm>
+          <a:off x="0" y="0"/>
+          <a:ext cx="0" cy="0"/>
+          <a:chOff x="0" y="0"/>
+          <a:chExt cx="0" cy="0"/>
+        </a:xfrm>
+      </p:grpSpPr>
+      <p:pic>
+        <p:nvPicPr>
+          <p:cNvPr id="2" name="Picture 1"/>
+          <p:cNvPicPr>
+            <a:picLocks noChangeAspect="1"/>
+          </p:cNvPicPr>
+          <p:nvPr/>
+        </p:nvPicPr>
+        <p:blipFill>
+          <a:blip r:embed="rId3"/>
+          <a:stretch>
+            <a:fillRect/>
+          </a:stretch>
+        </p:blipFill>
+        <p:spPr>
+          <a:xfrm>
+            <a:off x="873539" y="1248343"/>
+            <a:ext cx="9631840" cy="2486943"/>
+          </a:xfrm>
+          <a:prstGeom prst="rect">
+            <a:avLst/>
+          </a:prstGeom>
+        </p:spPr>
+      </p:pic>
+      <p:sp>
+        <p:nvSpPr>
+          <p:cNvPr id="3" name="TextBox 2"/>
+          <p:cNvSpPr txBox="1"/>
+          <p:nvPr/>
+        </p:nvSpPr>
+        <p:spPr>
+          <a:xfrm>
+            <a:off x="873539" y="879011"/>
+            <a:ext cx="2054217" cy="369332"/>
+          </a:xfrm>
+          <a:prstGeom prst="rect">
+            <a:avLst/>
+          </a:prstGeom>
+          <a:solidFill>
+            <a:srgbClr val="FFC000"/>
+          </a:solidFill>
+        </p:spPr>
+        <p:txBody>
+          <a:bodyPr wrap="none" rtlCol="0">
+            <a:spAutoFit/>
+          </a:bodyPr>
+          <a:lstStyle/>
+          <a:p>
+            <a:r>
+              <a:rPr lang="en-US" dirty="0"/>
+              <a:t>Check Windows</a:t>
+            </a:r>
+            <a:r>
+              <a:rPr lang="en-US" i="1" dirty="0">
+                <a:solidFill>
+                  <a:srgbClr val="7030A0"/>
+                </a:solidFill>
+              </a:rPr>
+              <a:t> .</a:t>
+            </a:r>
+            <a:r>
+              <a:rPr lang="en-US" i="1" dirty="0" err="1">
+                <a:solidFill>
+                  <a:srgbClr val="7030A0"/>
+                </a:solidFill>
+              </a:rPr>
+              <a:t>lnk</a:t>
+            </a:r>
+            <a:endParaRPr lang="en-US" i="1" dirty="0">
+              <a:solidFill>
+                <a:srgbClr val="7030A0"/>
+              </a:solidFill>
+            </a:endParaRPr>
+          </a:p>
+        </p:txBody>
+      </p:sp>
+      <p:pic>
+        <p:nvPicPr>
+          <p:cNvPr id="4" name="Picture 3"/>
+          <p:cNvPicPr>
+            <a:picLocks noChangeAspect="1"/>
+          </p:cNvPicPr>
+          <p:nvPr/>
+        </p:nvPicPr>
+        <p:blipFill>
+          <a:blip r:embed="rId4"/>
+          <a:stretch>
+            <a:fillRect/>
+          </a:stretch>
+        </p:blipFill>
+        <p:spPr>
+          <a:xfrm>
+            <a:off x="873540" y="4421260"/>
+            <a:ext cx="9701426" cy="1484327"/>
+          </a:xfrm>
+          <a:prstGeom prst="rect">
+            <a:avLst/>
+          </a:prstGeom>
+        </p:spPr>
+      </p:pic>
+      <p:sp>
+        <p:nvSpPr>
+          <p:cNvPr id="5" name="TextBox 4"/>
+          <p:cNvSpPr txBox="1"/>
+          <p:nvPr/>
+        </p:nvSpPr>
+        <p:spPr>
+          <a:xfrm>
+            <a:off x="873539" y="4051928"/>
+            <a:ext cx="1743747" cy="369332"/>
+          </a:xfrm>
+          <a:prstGeom prst="rect">
+            <a:avLst/>
+          </a:prstGeom>
+          <a:solidFill>
+            <a:srgbClr val="FFC000"/>
+          </a:solidFill>
+        </p:spPr>
+        <p:txBody>
+          <a:bodyPr wrap="none" rtlCol="0">
+            <a:spAutoFit/>
+          </a:bodyPr>
+          <a:lstStyle/>
+          <a:p>
+            <a:r>
+              <a:rPr lang="en-US" dirty="0"/>
+              <a:t>Check Office</a:t>
+            </a:r>
+            <a:r>
+              <a:rPr lang="en-US" i="1" dirty="0">
+                <a:solidFill>
+                  <a:srgbClr val="7030A0"/>
+                </a:solidFill>
+              </a:rPr>
+              <a:t> .</a:t>
+            </a:r>
+            <a:r>
+              <a:rPr lang="en-US" i="1" dirty="0" err="1">
+                <a:solidFill>
+                  <a:srgbClr val="7030A0"/>
+                </a:solidFill>
+              </a:rPr>
+              <a:t>lnk</a:t>
+            </a:r>
+            <a:endParaRPr lang="en-US" i="1" dirty="0">
+              <a:solidFill>
+                <a:srgbClr val="7030A0"/>
+              </a:solidFill>
+            </a:endParaRPr>
+          </a:p>
+        </p:txBody>
+      </p:sp>
+    </p:spTree>
+    <p:extLst>
+      <p:ext uri="{BB962C8B-B14F-4D97-AF65-F5344CB8AC3E}">
+        <p14:creationId xmlns:p14="http://schemas.microsoft.com/office/powerpoint/2010/main" val="2741262411"/>
+      </p:ext>
+    </p:extLst>
+  </p:cSld>
+  <p:clrMapOvr>
+    <a:masterClrMapping/>
+  </p:clrMapOvr>
+</p:sld>
+</file>
+
+<file path=ppt/slides/slide12.xml><?xml version="1.0" encoding="utf-8"?>
+<p:sld xmlns:a="http://schemas.openxmlformats.org/drawingml/2006/main" xmlns:r="http://schemas.openxmlformats.org/officeDocument/2006/relationships" xmlns:p="http://schemas.openxmlformats.org/presentationml/2006/main">
+  <p:cSld>
+    <p:spTree>
+      <p:nvGrpSpPr>
+        <p:cNvPr id="1" name=""/>
+        <p:cNvGrpSpPr/>
+        <p:nvPr/>
+      </p:nvGrpSpPr>
+      <p:grpSpPr>
+        <a:xfrm>
+          <a:off x="0" y="0"/>
+          <a:ext cx="0" cy="0"/>
+          <a:chOff x="0" y="0"/>
+          <a:chExt cx="0" cy="0"/>
+        </a:xfrm>
+      </p:grpSpPr>
+      <p:pic>
+        <p:nvPicPr>
+          <p:cNvPr id="2" name="Picture 1"/>
+          <p:cNvPicPr>
+            <a:picLocks noChangeAspect="1"/>
+          </p:cNvPicPr>
+          <p:nvPr/>
+        </p:nvPicPr>
+        <p:blipFill>
+          <a:blip r:embed="rId3"/>
+          <a:stretch>
+            <a:fillRect/>
+          </a:stretch>
+        </p:blipFill>
+        <p:spPr>
+          <a:xfrm>
+            <a:off x="838200" y="2129635"/>
+            <a:ext cx="9007621" cy="3574090"/>
+          </a:xfrm>
+          <a:prstGeom prst="rect">
+            <a:avLst/>
+          </a:prstGeom>
+        </p:spPr>
+      </p:pic>
+      <p:sp>
+        <p:nvSpPr>
+          <p:cNvPr id="3" name="TextBox 2"/>
+          <p:cNvSpPr txBox="1"/>
+          <p:nvPr/>
+        </p:nvSpPr>
+        <p:spPr>
+          <a:xfrm>
+            <a:off x="838200" y="1760303"/>
+            <a:ext cx="2567178" cy="369332"/>
+          </a:xfrm>
+          <a:prstGeom prst="rect">
+            <a:avLst/>
+          </a:prstGeom>
+          <a:solidFill>
+            <a:srgbClr val="FFC000"/>
+          </a:solidFill>
+        </p:spPr>
+        <p:txBody>
+          <a:bodyPr wrap="none" rtlCol="0">
+            <a:spAutoFit/>
+          </a:bodyPr>
+          <a:lstStyle/>
+          <a:p>
+            <a:r>
+              <a:rPr lang="en-US" dirty="0"/>
+              <a:t>View a </a:t>
+            </a:r>
+            <a:r>
+              <a:rPr lang="en-US" i="1" dirty="0">
+                <a:solidFill>
+                  <a:srgbClr val="7030A0"/>
+                </a:solidFill>
+              </a:rPr>
+              <a:t>.</a:t>
+            </a:r>
+            <a:r>
+              <a:rPr lang="en-US" i="1" dirty="0" err="1">
+                <a:solidFill>
+                  <a:srgbClr val="7030A0"/>
+                </a:solidFill>
+              </a:rPr>
+              <a:t>lnk</a:t>
+            </a:r>
+            <a:r>
+              <a:rPr lang="en-US" i="1" dirty="0">
+                <a:solidFill>
+                  <a:srgbClr val="7030A0"/>
+                </a:solidFill>
+              </a:rPr>
+              <a:t> </a:t>
+            </a:r>
+            <a:r>
+              <a:rPr lang="en-US" dirty="0"/>
+              <a:t>in binary form</a:t>
+            </a:r>
+          </a:p>
+        </p:txBody>
+      </p:sp>
+      <p:sp>
+        <p:nvSpPr>
+          <p:cNvPr id="4" name="Title 3"/>
+          <p:cNvSpPr>
+            <a:spLocks noGrp="1"/>
+          </p:cNvSpPr>
+          <p:nvPr>
+            <p:ph type="title"/>
+          </p:nvPr>
+        </p:nvSpPr>
+        <p:spPr/>
+        <p:txBody>
+          <a:bodyPr/>
+          <a:lstStyle/>
+          <a:p>
+            <a:r>
+              <a:rPr lang="en-US" dirty="0"/>
+              <a:t>How to view </a:t>
+            </a:r>
+            <a:r>
+              <a:rPr lang="en-US" i="1" dirty="0">
+                <a:solidFill>
+                  <a:srgbClr val="FF0000"/>
+                </a:solidFill>
+              </a:rPr>
+              <a:t>.</a:t>
+            </a:r>
+            <a:r>
+              <a:rPr lang="en-US" i="1" dirty="0" err="1">
+                <a:solidFill>
+                  <a:srgbClr val="FF0000"/>
+                </a:solidFill>
+              </a:rPr>
+              <a:t>lnk</a:t>
+            </a:r>
+            <a:endParaRPr lang="en-US" i="1" dirty="0">
+              <a:solidFill>
+                <a:srgbClr val="FF0000"/>
+              </a:solidFill>
+            </a:endParaRPr>
+          </a:p>
+        </p:txBody>
+      </p:sp>
+    </p:spTree>
+    <p:extLst>
+      <p:ext uri="{BB962C8B-B14F-4D97-AF65-F5344CB8AC3E}">
+        <p14:creationId xmlns:p14="http://schemas.microsoft.com/office/powerpoint/2010/main" val="3999839786"/>
+      </p:ext>
+    </p:extLst>
+  </p:cSld>
+  <p:clrMapOvr>
+    <a:masterClrMapping/>
+  </p:clrMapOvr>
+</p:sld>
+</file>
+
+<file path=ppt/slides/slide13.xml><?xml version="1.0" encoding="utf-8"?>
+<p:sld xmlns:a="http://schemas.openxmlformats.org/drawingml/2006/main" xmlns:r="http://schemas.openxmlformats.org/officeDocument/2006/relationships" xmlns:p="http://schemas.openxmlformats.org/presentationml/2006/main">
+  <p:cSld>
+    <p:spTree>
+      <p:nvGrpSpPr>
+        <p:cNvPr id="1" name=""/>
+        <p:cNvGrpSpPr/>
+        <p:nvPr/>
+      </p:nvGrpSpPr>
+      <p:grpSpPr>
+        <a:xfrm>
+          <a:off x="0" y="0"/>
+          <a:ext cx="0" cy="0"/>
+          <a:chOff x="0" y="0"/>
+          <a:chExt cx="0" cy="0"/>
+        </a:xfrm>
+      </p:grpSpPr>
+      <p:sp>
+        <p:nvSpPr>
+          <p:cNvPr id="2" name="Title 1"/>
+          <p:cNvSpPr>
+            <a:spLocks noGrp="1"/>
+          </p:cNvSpPr>
+          <p:nvPr>
+            <p:ph type="title"/>
+          </p:nvPr>
+        </p:nvSpPr>
+        <p:spPr/>
+        <p:txBody>
+          <a:bodyPr/>
+          <a:lstStyle/>
+          <a:p>
+            <a:r>
+              <a:rPr lang="en-US" dirty="0"/>
               <a:t>Parse </a:t>
             </a:r>
             <a:r>
@@ -6166,7 +7085,7 @@
 </p:sld>
 </file>
 
-<file path=ppt/slides/slide11.xml><?xml version="1.0" encoding="utf-8"?>
+<file path=ppt/slides/slide14.xml><?xml version="1.0" encoding="utf-8"?>
 <p:sld xmlns:a="http://schemas.openxmlformats.org/drawingml/2006/main" xmlns:r="http://schemas.openxmlformats.org/officeDocument/2006/relationships" xmlns:p="http://schemas.openxmlformats.org/presentationml/2006/main">
   <p:cSld>
     <p:spTree>
@@ -6347,7 +7266,7 @@
 </p:sld>
 </file>
 
-<file path=ppt/slides/slide12.xml><?xml version="1.0" encoding="utf-8"?>
+<file path=ppt/slides/slide15.xml><?xml version="1.0" encoding="utf-8"?>
 <p:sld xmlns:a="http://schemas.openxmlformats.org/drawingml/2006/main" xmlns:r="http://schemas.openxmlformats.org/officeDocument/2006/relationships" xmlns:p="http://schemas.openxmlformats.org/presentationml/2006/main">
   <p:cSld>
     <p:spTree>
@@ -6447,7 +7366,7 @@
 </p:sld>
 </file>
 
-<file path=ppt/slides/slide13.xml><?xml version="1.0" encoding="utf-8"?>
+<file path=ppt/slides/slide16.xml><?xml version="1.0" encoding="utf-8"?>
 <p:sld xmlns:a="http://schemas.openxmlformats.org/drawingml/2006/main" xmlns:r="http://schemas.openxmlformats.org/officeDocument/2006/relationships" xmlns:p="http://schemas.openxmlformats.org/presentationml/2006/main">
   <p:cSld>
     <p:spTree>
@@ -6678,6 +7597,91 @@
           </a:p>
         </p:txBody>
       </p:sp>
+      <p:sp>
+        <p:nvSpPr>
+          <p:cNvPr id="4" name="Arrow: Right 3">
+            <a:extLst>
+              <a:ext uri="{FF2B5EF4-FFF2-40B4-BE49-F238E27FC236}">
+                <a16:creationId xmlns:a16="http://schemas.microsoft.com/office/drawing/2014/main" id="{ADAFF1AC-213B-4922-8843-9315FCDAA337}"/>
+              </a:ext>
+            </a:extLst>
+          </p:cNvPr>
+          <p:cNvSpPr/>
+          <p:nvPr/>
+        </p:nvSpPr>
+        <p:spPr>
+          <a:xfrm rot="10800000">
+            <a:off x="8570563" y="5633634"/>
+            <a:ext cx="1249628" cy="515629"/>
+          </a:xfrm>
+          <a:prstGeom prst="rightArrow">
+            <a:avLst/>
+          </a:prstGeom>
+        </p:spPr>
+        <p:style>
+          <a:lnRef idx="2">
+            <a:schemeClr val="accent1">
+              <a:shade val="50000"/>
+            </a:schemeClr>
+          </a:lnRef>
+          <a:fillRef idx="1">
+            <a:schemeClr val="accent1"/>
+          </a:fillRef>
+          <a:effectRef idx="0">
+            <a:schemeClr val="accent1"/>
+          </a:effectRef>
+          <a:fontRef idx="minor">
+            <a:schemeClr val="lt1"/>
+          </a:fontRef>
+        </p:style>
+        <p:txBody>
+          <a:bodyPr rtlCol="0" anchor="ctr"/>
+          <a:lstStyle/>
+          <a:p>
+            <a:pPr algn="ctr"/>
+            <a:endParaRPr lang="en-US"/>
+          </a:p>
+        </p:txBody>
+      </p:sp>
+      <p:sp>
+        <p:nvSpPr>
+          <p:cNvPr id="5" name="TextBox 4">
+            <a:extLst>
+              <a:ext uri="{FF2B5EF4-FFF2-40B4-BE49-F238E27FC236}">
+                <a16:creationId xmlns:a16="http://schemas.microsoft.com/office/drawing/2014/main" id="{C004582E-6201-42C3-B643-1B5FCB35DC84}"/>
+              </a:ext>
+            </a:extLst>
+          </p:cNvPr>
+          <p:cNvSpPr txBox="1"/>
+          <p:nvPr/>
+        </p:nvSpPr>
+        <p:spPr>
+          <a:xfrm>
+            <a:off x="8911526" y="5374185"/>
+            <a:ext cx="1030988" cy="369332"/>
+          </a:xfrm>
+          <a:prstGeom prst="rect">
+            <a:avLst/>
+          </a:prstGeom>
+          <a:noFill/>
+        </p:spPr>
+        <p:txBody>
+          <a:bodyPr wrap="none" rtlCol="0">
+            <a:spAutoFit/>
+          </a:bodyPr>
+          <a:lstStyle/>
+          <a:p>
+            <a:r>
+              <a:rPr lang="en-US" dirty="0">
+                <a:solidFill>
+                  <a:srgbClr val="FF0000"/>
+                </a:solidFill>
+              </a:rPr>
+              <a:t>focus on </a:t>
+            </a:r>
+          </a:p>
+        </p:txBody>
+      </p:sp>
     </p:spTree>
     <p:extLst>
       <p:ext uri="{BB962C8B-B14F-4D97-AF65-F5344CB8AC3E}">
@@ -6691,7 +7695,7 @@
 </p:sld>
 </file>
 
-<file path=ppt/slides/slide14.xml><?xml version="1.0" encoding="utf-8"?>
+<file path=ppt/slides/slide17.xml><?xml version="1.0" encoding="utf-8"?>
 <p:sld xmlns:a="http://schemas.openxmlformats.org/drawingml/2006/main" xmlns:r="http://schemas.openxmlformats.org/officeDocument/2006/relationships" xmlns:p="http://schemas.openxmlformats.org/presentationml/2006/main">
   <p:cSld>
     <p:spTree>
@@ -6767,7 +7771,7 @@
 </p:sld>
 </file>
 
-<file path=ppt/slides/slide15.xml><?xml version="1.0" encoding="utf-8"?>
+<file path=ppt/slides/slide18.xml><?xml version="1.0" encoding="utf-8"?>
 <p:sld xmlns:a="http://schemas.openxmlformats.org/drawingml/2006/main" xmlns:r="http://schemas.openxmlformats.org/officeDocument/2006/relationships" xmlns:p="http://schemas.openxmlformats.org/presentationml/2006/main">
   <p:cSld>
     <p:spTree>
@@ -7361,7 +8365,7 @@
 </p:sld>
 </file>
 
-<file path=ppt/slides/slide16.xml><?xml version="1.0" encoding="utf-8"?>
+<file path=ppt/slides/slide19.xml><?xml version="1.0" encoding="utf-8"?>
 <p:sld xmlns:a="http://schemas.openxmlformats.org/drawingml/2006/main" xmlns:r="http://schemas.openxmlformats.org/officeDocument/2006/relationships" xmlns:p="http://schemas.openxmlformats.org/presentationml/2006/main">
   <p:cSld>
     <p:spTree>
@@ -7473,7 +8477,222 @@
 </p:sld>
 </file>
 
-<file path=ppt/slides/slide17.xml><?xml version="1.0" encoding="utf-8"?>
+<file path=ppt/slides/slide2.xml><?xml version="1.0" encoding="utf-8"?>
+<p:sld xmlns:a="http://schemas.openxmlformats.org/drawingml/2006/main" xmlns:r="http://schemas.openxmlformats.org/officeDocument/2006/relationships" xmlns:p="http://schemas.openxmlformats.org/presentationml/2006/main">
+  <p:cSld>
+    <p:spTree>
+      <p:nvGrpSpPr>
+        <p:cNvPr id="1" name=""/>
+        <p:cNvGrpSpPr/>
+        <p:nvPr/>
+      </p:nvGrpSpPr>
+      <p:grpSpPr>
+        <a:xfrm>
+          <a:off x="0" y="0"/>
+          <a:ext cx="0" cy="0"/>
+          <a:chOff x="0" y="0"/>
+          <a:chExt cx="0" cy="0"/>
+        </a:xfrm>
+      </p:grpSpPr>
+      <p:sp>
+        <p:nvSpPr>
+          <p:cNvPr id="2" name="Title 1">
+            <a:extLst>
+              <a:ext uri="{FF2B5EF4-FFF2-40B4-BE49-F238E27FC236}">
+                <a16:creationId xmlns:a16="http://schemas.microsoft.com/office/drawing/2014/main" id="{CA125AEA-7A84-4F6A-A146-D497F71BE68F}"/>
+              </a:ext>
+            </a:extLst>
+          </p:cNvPr>
+          <p:cNvSpPr>
+            <a:spLocks noGrp="1"/>
+          </p:cNvSpPr>
+          <p:nvPr>
+            <p:ph type="title"/>
+          </p:nvPr>
+        </p:nvSpPr>
+        <p:spPr/>
+        <p:txBody>
+          <a:bodyPr/>
+          <a:lstStyle/>
+          <a:p>
+            <a:r>
+              <a:rPr lang="en-US" dirty="0"/>
+              <a:t>Evidence related to traversed directories </a:t>
+            </a:r>
+          </a:p>
+        </p:txBody>
+      </p:sp>
+      <p:sp>
+        <p:nvSpPr>
+          <p:cNvPr id="3" name="Content Placeholder 2">
+            <a:extLst>
+              <a:ext uri="{FF2B5EF4-FFF2-40B4-BE49-F238E27FC236}">
+                <a16:creationId xmlns:a16="http://schemas.microsoft.com/office/drawing/2014/main" id="{53A2B3A9-CADA-4EE7-963F-CCF7898F9DD2}"/>
+              </a:ext>
+            </a:extLst>
+          </p:cNvPr>
+          <p:cNvSpPr>
+            <a:spLocks noGrp="1"/>
+          </p:cNvSpPr>
+          <p:nvPr>
+            <p:ph idx="1"/>
+          </p:nvPr>
+        </p:nvSpPr>
+        <p:spPr/>
+        <p:txBody>
+          <a:bodyPr/>
+          <a:lstStyle/>
+          <a:p>
+            <a:r>
+              <a:rPr lang="en-US" dirty="0"/>
+              <a:t>Investigate artifacts that contain </a:t>
+            </a:r>
+            <a:r>
+              <a:rPr lang="en-US" dirty="0">
+                <a:solidFill>
+                  <a:srgbClr val="7030A0"/>
+                </a:solidFill>
+              </a:rPr>
+              <a:t>only</a:t>
+            </a:r>
+            <a:r>
+              <a:rPr lang="en-US" dirty="0"/>
+              <a:t> </a:t>
+            </a:r>
+            <a:r>
+              <a:rPr lang="en-US" dirty="0">
+                <a:solidFill>
+                  <a:srgbClr val="FF0000"/>
+                </a:solidFill>
+              </a:rPr>
+              <a:t>traversed directories</a:t>
+            </a:r>
+          </a:p>
+          <a:p>
+            <a:pPr lvl="1"/>
+            <a:r>
+              <a:rPr lang="en-US" dirty="0" err="1"/>
+              <a:t>shellbag</a:t>
+            </a:r>
+            <a:r>
+              <a:rPr lang="en-US" dirty="0"/>
+              <a:t>, </a:t>
+            </a:r>
+          </a:p>
+          <a:p>
+            <a:pPr lvl="1"/>
+            <a:r>
+              <a:rPr lang="en-US" dirty="0" err="1"/>
+              <a:t>Jumplist</a:t>
+            </a:r>
+            <a:r>
+              <a:rPr lang="en-US" dirty="0"/>
+              <a:t> (</a:t>
+            </a:r>
+            <a:r>
+              <a:rPr lang="en-US" dirty="0" err="1"/>
+              <a:t>AutomaticDestinations</a:t>
+            </a:r>
+            <a:r>
+              <a:rPr lang="en-US" dirty="0"/>
+              <a:t>, </a:t>
+            </a:r>
+            <a:r>
+              <a:rPr lang="en-US" dirty="0" err="1"/>
+              <a:t>CustomDestinations</a:t>
+            </a:r>
+            <a:r>
+              <a:rPr lang="en-US" dirty="0"/>
+              <a:t>)</a:t>
+            </a:r>
+          </a:p>
+          <a:p>
+            <a:r>
+              <a:rPr lang="en-US" dirty="0"/>
+              <a:t>Investigate artifacts that  traversed files </a:t>
+            </a:r>
+            <a:r>
+              <a:rPr lang="en-US" dirty="0">
+                <a:solidFill>
+                  <a:srgbClr val="7030A0"/>
+                </a:solidFill>
+              </a:rPr>
+              <a:t>also</a:t>
+            </a:r>
+            <a:r>
+              <a:rPr lang="en-US" dirty="0"/>
+              <a:t> contain </a:t>
+            </a:r>
+            <a:r>
+              <a:rPr lang="en-US" dirty="0">
+                <a:solidFill>
+                  <a:srgbClr val="FF0000"/>
+                </a:solidFill>
+              </a:rPr>
+              <a:t>traversed directories</a:t>
+            </a:r>
+          </a:p>
+          <a:p>
+            <a:pPr lvl="1"/>
+            <a:r>
+              <a:rPr lang="en-US" dirty="0" err="1"/>
+              <a:t>Jumplist</a:t>
+            </a:r>
+            <a:r>
+              <a:rPr lang="en-US" dirty="0"/>
+              <a:t> (</a:t>
+            </a:r>
+            <a:r>
+              <a:rPr lang="en-US" dirty="0" err="1"/>
+              <a:t>AutomaticDestinations</a:t>
+            </a:r>
+            <a:r>
+              <a:rPr lang="en-US" dirty="0"/>
+              <a:t>, </a:t>
+            </a:r>
+            <a:r>
+              <a:rPr lang="en-US" dirty="0" err="1"/>
+              <a:t>CustomDestinations</a:t>
+            </a:r>
+            <a:r>
+              <a:rPr lang="en-US" dirty="0"/>
+              <a:t>)</a:t>
+            </a:r>
+          </a:p>
+          <a:p>
+            <a:pPr lvl="1"/>
+            <a:r>
+              <a:rPr lang="en-US" dirty="0"/>
+              <a:t>Links</a:t>
+            </a:r>
+          </a:p>
+          <a:p>
+            <a:pPr lvl="1"/>
+            <a:endParaRPr lang="en-US" dirty="0"/>
+          </a:p>
+          <a:p>
+            <a:pPr lvl="1"/>
+            <a:endParaRPr lang="en-US" dirty="0"/>
+          </a:p>
+          <a:p>
+            <a:endParaRPr lang="en-US" dirty="0"/>
+          </a:p>
+        </p:txBody>
+      </p:sp>
+    </p:spTree>
+    <p:extLst>
+      <p:ext uri="{BB962C8B-B14F-4D97-AF65-F5344CB8AC3E}">
+        <p14:creationId xmlns:p14="http://schemas.microsoft.com/office/powerpoint/2010/main" val="2772101945"/>
+      </p:ext>
+    </p:extLst>
+  </p:cSld>
+  <p:clrMapOvr>
+    <a:masterClrMapping/>
+  </p:clrMapOvr>
+</p:sld>
+</file>
+
+<file path=ppt/slides/slide20.xml><?xml version="1.0" encoding="utf-8"?>
 <p:sld xmlns:a="http://schemas.openxmlformats.org/drawingml/2006/main" xmlns:r="http://schemas.openxmlformats.org/officeDocument/2006/relationships" xmlns:p="http://schemas.openxmlformats.org/presentationml/2006/main">
   <p:cSld>
     <p:spTree>
@@ -7601,7 +8820,7 @@
 </p:sld>
 </file>
 
-<file path=ppt/slides/slide18.xml><?xml version="1.0" encoding="utf-8"?>
+<file path=ppt/slides/slide21.xml><?xml version="1.0" encoding="utf-8"?>
 <p:sld xmlns:a="http://schemas.openxmlformats.org/drawingml/2006/main" xmlns:r="http://schemas.openxmlformats.org/officeDocument/2006/relationships" xmlns:p="http://schemas.openxmlformats.org/presentationml/2006/main">
   <p:cSld>
     <p:spTree>
@@ -7744,7 +8963,7 @@
           <a:p>
             <a:r>
               <a:rPr lang="en-US" dirty="0"/>
-              <a:t>Installation/Uninstall/Execution related Registry</a:t>
+              <a:t>Registry that related to Installation/Uninstall/Execution</a:t>
             </a:r>
           </a:p>
           <a:p>
@@ -7801,7 +9020,7 @@
 </p:sld>
 </file>
 
-<file path=ppt/slides/slide19.xml><?xml version="1.0" encoding="utf-8"?>
+<file path=ppt/slides/slide22.xml><?xml version="1.0" encoding="utf-8"?>
 <p:sld xmlns:a="http://schemas.openxmlformats.org/drawingml/2006/main" xmlns:r="http://schemas.openxmlformats.org/officeDocument/2006/relationships" xmlns:p="http://schemas.openxmlformats.org/presentationml/2006/main">
   <p:cSld>
     <p:spTree>
@@ -7922,229 +9141,7 @@
 </p:sld>
 </file>
 
-<file path=ppt/slides/slide2.xml><?xml version="1.0" encoding="utf-8"?>
-<p:sld xmlns:a="http://schemas.openxmlformats.org/drawingml/2006/main" xmlns:r="http://schemas.openxmlformats.org/officeDocument/2006/relationships" xmlns:p="http://schemas.openxmlformats.org/presentationml/2006/main">
-  <p:cSld>
-    <p:spTree>
-      <p:nvGrpSpPr>
-        <p:cNvPr id="1" name=""/>
-        <p:cNvGrpSpPr/>
-        <p:nvPr/>
-      </p:nvGrpSpPr>
-      <p:grpSpPr>
-        <a:xfrm>
-          <a:off x="0" y="0"/>
-          <a:ext cx="0" cy="0"/>
-          <a:chOff x="0" y="0"/>
-          <a:chExt cx="0" cy="0"/>
-        </a:xfrm>
-      </p:grpSpPr>
-      <p:sp>
-        <p:nvSpPr>
-          <p:cNvPr id="2" name="Title 1"/>
-          <p:cNvSpPr>
-            <a:spLocks noGrp="1"/>
-          </p:cNvSpPr>
-          <p:nvPr>
-            <p:ph type="title"/>
-          </p:nvPr>
-        </p:nvSpPr>
-        <p:spPr/>
-        <p:txBody>
-          <a:bodyPr/>
-          <a:lstStyle/>
-          <a:p>
-            <a:r>
-              <a:rPr lang="en-US" dirty="0">
-                <a:solidFill>
-                  <a:srgbClr val="FF0000"/>
-                </a:solidFill>
-              </a:rPr>
-              <a:t>27.</a:t>
-            </a:r>
-            <a:r>
-              <a:rPr lang="en-US" dirty="0"/>
-              <a:t>	List all directories that were traversed in the company’s network drive.</a:t>
-            </a:r>
-          </a:p>
-        </p:txBody>
-      </p:sp>
-      <p:sp>
-        <p:nvSpPr>
-          <p:cNvPr id="7" name="Content Placeholder 6"/>
-          <p:cNvSpPr>
-            <a:spLocks noGrp="1"/>
-          </p:cNvSpPr>
-          <p:nvPr>
-            <p:ph idx="1"/>
-          </p:nvPr>
-        </p:nvSpPr>
-        <p:spPr/>
-        <p:txBody>
-          <a:bodyPr>
-            <a:normAutofit fontScale="77500" lnSpcReduction="20000"/>
-          </a:bodyPr>
-          <a:lstStyle/>
-          <a:p>
-            <a:pPr marL="0" indent="0">
-              <a:buNone/>
-            </a:pPr>
-            <a:r>
-              <a:rPr lang="en-US" dirty="0"/>
-              <a:t>- ‘Timestamp’ may not be accurate.</a:t>
-            </a:r>
-          </a:p>
-          <a:p>
-            <a:pPr marL="0" indent="0">
-              <a:buNone/>
-            </a:pPr>
-            <a:r>
-              <a:rPr lang="en-US" dirty="0"/>
-              <a:t>- V:\ is mapped on \\10.11.11.128</a:t>
-            </a:r>
-          </a:p>
-          <a:p>
-            <a:pPr marL="0" indent="0">
-              <a:buNone/>
-            </a:pPr>
-            <a:endParaRPr lang="en-US" dirty="0"/>
-          </a:p>
-          <a:p>
-            <a:pPr marL="0" indent="0">
-              <a:buNone/>
-            </a:pPr>
-            <a:r>
-              <a:rPr lang="en-US" dirty="0"/>
-              <a:t>HKU\informant\Software\Classes\Local Settings\Software\Microsoft\Windows\Shell\</a:t>
-            </a:r>
-            <a:r>
-              <a:rPr lang="en-US" dirty="0" err="1"/>
-              <a:t>BagMRU</a:t>
-            </a:r>
-            <a:r>
-              <a:rPr lang="en-US" dirty="0"/>
-              <a:t>\8\0\~</a:t>
-            </a:r>
-          </a:p>
-          <a:p>
-            <a:pPr marL="0" indent="0">
-              <a:buNone/>
-            </a:pPr>
-            <a:endParaRPr lang="en-US" dirty="0"/>
-          </a:p>
-          <a:p>
-            <a:pPr marL="0" indent="0">
-              <a:buNone/>
-            </a:pPr>
-            <a:r>
-              <a:rPr lang="en-US" dirty="0"/>
-              <a:t>\User\informant\</a:t>
-            </a:r>
-            <a:r>
-              <a:rPr lang="en-US" dirty="0" err="1"/>
-              <a:t>AppData</a:t>
-            </a:r>
-            <a:r>
-              <a:rPr lang="en-US" dirty="0"/>
-              <a:t>\Roaming\Microsoft\Windows\Recent\</a:t>
-            </a:r>
-            <a:r>
-              <a:rPr lang="en-US" dirty="0" err="1"/>
-              <a:t>AutomaticDestinations</a:t>
-            </a:r>
-            <a:endParaRPr lang="en-US" dirty="0"/>
-          </a:p>
-          <a:p>
-            <a:pPr marL="0" indent="0">
-              <a:buNone/>
-            </a:pPr>
-            <a:r>
-              <a:rPr lang="en-US" dirty="0"/>
-              <a:t>\User\informant\</a:t>
-            </a:r>
-            <a:r>
-              <a:rPr lang="en-US" dirty="0" err="1"/>
-              <a:t>AppData</a:t>
-            </a:r>
-            <a:r>
-              <a:rPr lang="en-US" dirty="0"/>
-              <a:t>\Roaming\Microsoft\Windows\Recent\</a:t>
-            </a:r>
-            <a:r>
-              <a:rPr lang="en-US" dirty="0" err="1"/>
-              <a:t>CustomDestinations</a:t>
-            </a:r>
-            <a:endParaRPr lang="en-US" dirty="0"/>
-          </a:p>
-          <a:p>
-            <a:pPr marL="0" indent="0">
-              <a:buNone/>
-            </a:pPr>
-            <a:endParaRPr lang="en-US" dirty="0"/>
-          </a:p>
-          <a:p>
-            <a:pPr marL="0" indent="0">
-              <a:buNone/>
-            </a:pPr>
-            <a:r>
-              <a:rPr lang="en-US" dirty="0"/>
-              <a:t>\User\informant\</a:t>
-            </a:r>
-            <a:r>
-              <a:rPr lang="en-US" dirty="0" err="1"/>
-              <a:t>AppData</a:t>
-            </a:r>
-            <a:r>
-              <a:rPr lang="en-US" dirty="0"/>
-              <a:t>\Roaming\Microsoft\Windows\Recent\*.</a:t>
-            </a:r>
-            <a:r>
-              <a:rPr lang="en-US" dirty="0" err="1"/>
-              <a:t>lnk</a:t>
-            </a:r>
-            <a:endParaRPr lang="en-US" dirty="0"/>
-          </a:p>
-          <a:p>
-            <a:pPr marL="0" indent="0">
-              <a:buNone/>
-            </a:pPr>
-            <a:r>
-              <a:rPr lang="en-US" dirty="0"/>
-              <a:t>\User\informant\</a:t>
-            </a:r>
-            <a:r>
-              <a:rPr lang="en-US" dirty="0" err="1"/>
-              <a:t>AppData</a:t>
-            </a:r>
-            <a:r>
-              <a:rPr lang="en-US" dirty="0"/>
-              <a:t>\Roaming\Microsoft\Office\Recent\*.</a:t>
-            </a:r>
-            <a:r>
-              <a:rPr lang="en-US" dirty="0" err="1"/>
-              <a:t>lnk</a:t>
-            </a:r>
-            <a:endParaRPr lang="en-US" dirty="0"/>
-          </a:p>
-          <a:p>
-            <a:endParaRPr lang="en-US" dirty="0"/>
-          </a:p>
-        </p:txBody>
-      </p:sp>
-    </p:spTree>
-    <p:extLst>
-      <p:ext uri="{BB962C8B-B14F-4D97-AF65-F5344CB8AC3E}">
-        <p14:creationId xmlns:p14="http://schemas.microsoft.com/office/powerpoint/2010/main" val="367085107"/>
-      </p:ext>
-    </p:extLst>
-  </p:cSld>
-  <p:clrMapOvr>
-    <a:masterClrMapping/>
-  </p:clrMapOvr>
-</p:sld>
-</file>
-
-<file path=ppt/slides/slide20.xml><?xml version="1.0" encoding="utf-8"?>
+<file path=ppt/slides/slide23.xml><?xml version="1.0" encoding="utf-8"?>
 <p:sld xmlns:a="http://schemas.openxmlformats.org/drawingml/2006/main" xmlns:r="http://schemas.openxmlformats.org/officeDocument/2006/relationships" xmlns:p="http://schemas.openxmlformats.org/presentationml/2006/main">
   <p:cSld>
     <p:spTree>
@@ -8485,7 +9482,7 @@
 </p:sld>
 </file>
 
-<file path=ppt/slides/slide21.xml><?xml version="1.0" encoding="utf-8"?>
+<file path=ppt/slides/slide24.xml><?xml version="1.0" encoding="utf-8"?>
 <p:sld xmlns:a="http://schemas.openxmlformats.org/drawingml/2006/main" xmlns:r="http://schemas.openxmlformats.org/officeDocument/2006/relationships" xmlns:p="http://schemas.openxmlformats.org/presentationml/2006/main">
   <p:cSld>
     <p:spTree>
@@ -8569,7 +9566,7 @@
 </p:sld>
 </file>
 
-<file path=ppt/slides/slide22.xml><?xml version="1.0" encoding="utf-8"?>
+<file path=ppt/slides/slide25.xml><?xml version="1.0" encoding="utf-8"?>
 <p:sld xmlns:a="http://schemas.openxmlformats.org/drawingml/2006/main" xmlns:r="http://schemas.openxmlformats.org/officeDocument/2006/relationships" xmlns:p="http://schemas.openxmlformats.org/presentationml/2006/main">
   <p:cSld>
     <p:spTree>
@@ -8743,7 +9740,7 @@
 </p:sld>
 </file>
 
-<file path=ppt/slides/slide23.xml><?xml version="1.0" encoding="utf-8"?>
+<file path=ppt/slides/slide26.xml><?xml version="1.0" encoding="utf-8"?>
 <p:sld xmlns:a="http://schemas.openxmlformats.org/drawingml/2006/main" xmlns:r="http://schemas.openxmlformats.org/officeDocument/2006/relationships" xmlns:p="http://schemas.openxmlformats.org/presentationml/2006/main">
   <p:cSld>
     <p:spTree>
@@ -9086,7 +10083,7 @@
 </p:sld>
 </file>
 
-<file path=ppt/slides/slide24.xml><?xml version="1.0" encoding="utf-8"?>
+<file path=ppt/slides/slide27.xml><?xml version="1.0" encoding="utf-8"?>
 <p:sld xmlns:a="http://schemas.openxmlformats.org/drawingml/2006/main" xmlns:r="http://schemas.openxmlformats.org/officeDocument/2006/relationships" xmlns:p="http://schemas.openxmlformats.org/presentationml/2006/main">
   <p:cSld>
     <p:spTree>
@@ -9358,7 +10355,7 @@
 </p:sld>
 </file>
 
-<file path=ppt/slides/slide25.xml><?xml version="1.0" encoding="utf-8"?>
+<file path=ppt/slides/slide28.xml><?xml version="1.0" encoding="utf-8"?>
 <p:sld xmlns:a="http://schemas.openxmlformats.org/drawingml/2006/main" xmlns:r="http://schemas.openxmlformats.org/officeDocument/2006/relationships" xmlns:p="http://schemas.openxmlformats.org/presentationml/2006/main">
   <p:cSld>
     <p:spTree>
@@ -9451,7 +10448,7 @@
 </p:sld>
 </file>
 
-<file path=ppt/slides/slide26.xml><?xml version="1.0" encoding="utf-8"?>
+<file path=ppt/slides/slide29.xml><?xml version="1.0" encoding="utf-8"?>
 <p:sld xmlns:a="http://schemas.openxmlformats.org/drawingml/2006/main" xmlns:r="http://schemas.openxmlformats.org/officeDocument/2006/relationships" xmlns:p="http://schemas.openxmlformats.org/presentationml/2006/main">
   <p:cSld>
     <p:spTree>
@@ -9932,7 +10929,229 @@
 </p:sld>
 </file>
 
-<file path=ppt/slides/slide27.xml><?xml version="1.0" encoding="utf-8"?>
+<file path=ppt/slides/slide3.xml><?xml version="1.0" encoding="utf-8"?>
+<p:sld xmlns:a="http://schemas.openxmlformats.org/drawingml/2006/main" xmlns:r="http://schemas.openxmlformats.org/officeDocument/2006/relationships" xmlns:p="http://schemas.openxmlformats.org/presentationml/2006/main">
+  <p:cSld>
+    <p:spTree>
+      <p:nvGrpSpPr>
+        <p:cNvPr id="1" name=""/>
+        <p:cNvGrpSpPr/>
+        <p:nvPr/>
+      </p:nvGrpSpPr>
+      <p:grpSpPr>
+        <a:xfrm>
+          <a:off x="0" y="0"/>
+          <a:ext cx="0" cy="0"/>
+          <a:chOff x="0" y="0"/>
+          <a:chExt cx="0" cy="0"/>
+        </a:xfrm>
+      </p:grpSpPr>
+      <p:sp>
+        <p:nvSpPr>
+          <p:cNvPr id="2" name="Title 1"/>
+          <p:cNvSpPr>
+            <a:spLocks noGrp="1"/>
+          </p:cNvSpPr>
+          <p:nvPr>
+            <p:ph type="title"/>
+          </p:nvPr>
+        </p:nvSpPr>
+        <p:spPr/>
+        <p:txBody>
+          <a:bodyPr/>
+          <a:lstStyle/>
+          <a:p>
+            <a:r>
+              <a:rPr lang="en-US" dirty="0">
+                <a:solidFill>
+                  <a:srgbClr val="FF0000"/>
+                </a:solidFill>
+              </a:rPr>
+              <a:t>27.</a:t>
+            </a:r>
+            <a:r>
+              <a:rPr lang="en-US" dirty="0"/>
+              <a:t>	List all directories that were traversed in the company’s network drive.</a:t>
+            </a:r>
+          </a:p>
+        </p:txBody>
+      </p:sp>
+      <p:sp>
+        <p:nvSpPr>
+          <p:cNvPr id="7" name="Content Placeholder 6"/>
+          <p:cNvSpPr>
+            <a:spLocks noGrp="1"/>
+          </p:cNvSpPr>
+          <p:nvPr>
+            <p:ph idx="1"/>
+          </p:nvPr>
+        </p:nvSpPr>
+        <p:spPr/>
+        <p:txBody>
+          <a:bodyPr>
+            <a:normAutofit fontScale="77500" lnSpcReduction="20000"/>
+          </a:bodyPr>
+          <a:lstStyle/>
+          <a:p>
+            <a:pPr marL="0" indent="0">
+              <a:buNone/>
+            </a:pPr>
+            <a:r>
+              <a:rPr lang="en-US" dirty="0"/>
+              <a:t>- ‘Timestamp’ may not be accurate.</a:t>
+            </a:r>
+          </a:p>
+          <a:p>
+            <a:pPr marL="0" indent="0">
+              <a:buNone/>
+            </a:pPr>
+            <a:r>
+              <a:rPr lang="en-US" dirty="0"/>
+              <a:t>- V:\ is mapped on \\10.11.11.128</a:t>
+            </a:r>
+          </a:p>
+          <a:p>
+            <a:pPr marL="0" indent="0">
+              <a:buNone/>
+            </a:pPr>
+            <a:endParaRPr lang="en-US" dirty="0"/>
+          </a:p>
+          <a:p>
+            <a:pPr marL="0" indent="0">
+              <a:buNone/>
+            </a:pPr>
+            <a:r>
+              <a:rPr lang="en-US" dirty="0"/>
+              <a:t>HKU\informant\Software\Classes\Local Settings\Software\Microsoft\Windows\Shell\</a:t>
+            </a:r>
+            <a:r>
+              <a:rPr lang="en-US" dirty="0" err="1"/>
+              <a:t>BagMRU</a:t>
+            </a:r>
+            <a:r>
+              <a:rPr lang="en-US" dirty="0"/>
+              <a:t>\8\0\~</a:t>
+            </a:r>
+          </a:p>
+          <a:p>
+            <a:pPr marL="0" indent="0">
+              <a:buNone/>
+            </a:pPr>
+            <a:endParaRPr lang="en-US" dirty="0"/>
+          </a:p>
+          <a:p>
+            <a:pPr marL="0" indent="0">
+              <a:buNone/>
+            </a:pPr>
+            <a:r>
+              <a:rPr lang="en-US" dirty="0"/>
+              <a:t>\User\informant\</a:t>
+            </a:r>
+            <a:r>
+              <a:rPr lang="en-US" dirty="0" err="1"/>
+              <a:t>AppData</a:t>
+            </a:r>
+            <a:r>
+              <a:rPr lang="en-US" dirty="0"/>
+              <a:t>\Roaming\Microsoft\Windows\Recent\</a:t>
+            </a:r>
+            <a:r>
+              <a:rPr lang="en-US" dirty="0" err="1"/>
+              <a:t>AutomaticDestinations</a:t>
+            </a:r>
+            <a:endParaRPr lang="en-US" dirty="0"/>
+          </a:p>
+          <a:p>
+            <a:pPr marL="0" indent="0">
+              <a:buNone/>
+            </a:pPr>
+            <a:r>
+              <a:rPr lang="en-US" dirty="0"/>
+              <a:t>\User\informant\</a:t>
+            </a:r>
+            <a:r>
+              <a:rPr lang="en-US" dirty="0" err="1"/>
+              <a:t>AppData</a:t>
+            </a:r>
+            <a:r>
+              <a:rPr lang="en-US" dirty="0"/>
+              <a:t>\Roaming\Microsoft\Windows\Recent\</a:t>
+            </a:r>
+            <a:r>
+              <a:rPr lang="en-US" dirty="0" err="1"/>
+              <a:t>CustomDestinations</a:t>
+            </a:r>
+            <a:endParaRPr lang="en-US" dirty="0"/>
+          </a:p>
+          <a:p>
+            <a:pPr marL="0" indent="0">
+              <a:buNone/>
+            </a:pPr>
+            <a:endParaRPr lang="en-US" dirty="0"/>
+          </a:p>
+          <a:p>
+            <a:pPr marL="0" indent="0">
+              <a:buNone/>
+            </a:pPr>
+            <a:r>
+              <a:rPr lang="en-US" dirty="0"/>
+              <a:t>\User\informant\</a:t>
+            </a:r>
+            <a:r>
+              <a:rPr lang="en-US" dirty="0" err="1"/>
+              <a:t>AppData</a:t>
+            </a:r>
+            <a:r>
+              <a:rPr lang="en-US" dirty="0"/>
+              <a:t>\Roaming\Microsoft\Windows\Recent\*.</a:t>
+            </a:r>
+            <a:r>
+              <a:rPr lang="en-US" dirty="0" err="1"/>
+              <a:t>lnk</a:t>
+            </a:r>
+            <a:endParaRPr lang="en-US" dirty="0"/>
+          </a:p>
+          <a:p>
+            <a:pPr marL="0" indent="0">
+              <a:buNone/>
+            </a:pPr>
+            <a:r>
+              <a:rPr lang="en-US" dirty="0"/>
+              <a:t>\User\informant\</a:t>
+            </a:r>
+            <a:r>
+              <a:rPr lang="en-US" dirty="0" err="1"/>
+              <a:t>AppData</a:t>
+            </a:r>
+            <a:r>
+              <a:rPr lang="en-US" dirty="0"/>
+              <a:t>\Roaming\Microsoft\Office\Recent\*.</a:t>
+            </a:r>
+            <a:r>
+              <a:rPr lang="en-US" dirty="0" err="1"/>
+              <a:t>lnk</a:t>
+            </a:r>
+            <a:endParaRPr lang="en-US" dirty="0"/>
+          </a:p>
+          <a:p>
+            <a:endParaRPr lang="en-US" dirty="0"/>
+          </a:p>
+        </p:txBody>
+      </p:sp>
+    </p:spTree>
+    <p:extLst>
+      <p:ext uri="{BB962C8B-B14F-4D97-AF65-F5344CB8AC3E}">
+        <p14:creationId xmlns:p14="http://schemas.microsoft.com/office/powerpoint/2010/main" val="367085107"/>
+      </p:ext>
+    </p:extLst>
+  </p:cSld>
+  <p:clrMapOvr>
+    <a:masterClrMapping/>
+  </p:clrMapOvr>
+</p:sld>
+</file>
+
+<file path=ppt/slides/slide30.xml><?xml version="1.0" encoding="utf-8"?>
 <p:sld xmlns:a="http://schemas.openxmlformats.org/drawingml/2006/main" xmlns:r="http://schemas.openxmlformats.org/officeDocument/2006/relationships" xmlns:p="http://schemas.openxmlformats.org/presentationml/2006/main">
   <p:cSld>
     <p:spTree>
@@ -10045,7 +11264,7 @@
 </p:sld>
 </file>
 
-<file path=ppt/slides/slide28.xml><?xml version="1.0" encoding="utf-8"?>
+<file path=ppt/slides/slide31.xml><?xml version="1.0" encoding="utf-8"?>
 <p:sld xmlns:a="http://schemas.openxmlformats.org/drawingml/2006/main" xmlns:r="http://schemas.openxmlformats.org/officeDocument/2006/relationships" xmlns:p="http://schemas.openxmlformats.org/presentationml/2006/main">
   <p:cSld>
     <p:spTree>
@@ -10376,7 +11595,7 @@
 </p:sld>
 </file>
 
-<file path=ppt/slides/slide29.xml><?xml version="1.0" encoding="utf-8"?>
+<file path=ppt/slides/slide32.xml><?xml version="1.0" encoding="utf-8"?>
 <p:sld xmlns:a="http://schemas.openxmlformats.org/drawingml/2006/main" xmlns:r="http://schemas.openxmlformats.org/officeDocument/2006/relationships" xmlns:p="http://schemas.openxmlformats.org/presentationml/2006/main">
   <p:cSld>
     <p:spTree>
@@ -10579,7 +11798,7 @@
 </p:sld>
 </file>
 
-<file path=ppt/slides/slide3.xml><?xml version="1.0" encoding="utf-8"?>
+<file path=ppt/slides/slide4.xml><?xml version="1.0" encoding="utf-8"?>
 <p:sld xmlns:a="http://schemas.openxmlformats.org/drawingml/2006/main" xmlns:r="http://schemas.openxmlformats.org/officeDocument/2006/relationships" xmlns:p="http://schemas.openxmlformats.org/presentationml/2006/main">
   <p:cSld>
     <p:spTree>
@@ -10650,7 +11869,7 @@
         </p:blipFill>
         <p:spPr>
           <a:xfrm>
-            <a:off x="100798" y="228600"/>
+            <a:off x="100798" y="304415"/>
             <a:ext cx="24727292" cy="3692609"/>
           </a:xfrm>
           <a:prstGeom prst="rect">
@@ -10769,6 +11988,88 @@
           </a:fontRef>
         </p:style>
       </p:cxnSp>
+      <p:cxnSp>
+        <p:nvCxnSpPr>
+          <p:cNvPr id="7" name="Straight Arrow Connector 6">
+            <a:extLst>
+              <a:ext uri="{FF2B5EF4-FFF2-40B4-BE49-F238E27FC236}">
+                <a16:creationId xmlns:a16="http://schemas.microsoft.com/office/drawing/2014/main" id="{FD5F9C8A-6D8D-4F77-975F-0C8FB8231FCB}"/>
+              </a:ext>
+            </a:extLst>
+          </p:cNvPr>
+          <p:cNvCxnSpPr/>
+          <p:nvPr/>
+        </p:nvCxnSpPr>
+        <p:spPr>
+          <a:xfrm>
+            <a:off x="3386380" y="170481"/>
+            <a:ext cx="774915" cy="672759"/>
+          </a:xfrm>
+          <a:prstGeom prst="straightConnector1">
+            <a:avLst/>
+          </a:prstGeom>
+          <a:ln>
+            <a:tailEnd type="triangle"/>
+          </a:ln>
+        </p:spPr>
+        <p:style>
+          <a:lnRef idx="1">
+            <a:schemeClr val="accent2"/>
+          </a:lnRef>
+          <a:fillRef idx="0">
+            <a:schemeClr val="accent2"/>
+          </a:fillRef>
+          <a:effectRef idx="0">
+            <a:schemeClr val="accent2"/>
+          </a:effectRef>
+          <a:fontRef idx="minor">
+            <a:schemeClr val="tx1"/>
+          </a:fontRef>
+        </p:style>
+      </p:cxnSp>
+      <p:sp>
+        <p:nvSpPr>
+          <p:cNvPr id="10" name="TextBox 9">
+            <a:extLst>
+              <a:ext uri="{FF2B5EF4-FFF2-40B4-BE49-F238E27FC236}">
+                <a16:creationId xmlns:a16="http://schemas.microsoft.com/office/drawing/2014/main" id="{4C0A2281-8345-4E76-A7AF-5CDEB96A71DE}"/>
+              </a:ext>
+            </a:extLst>
+          </p:cNvPr>
+          <p:cNvSpPr txBox="1"/>
+          <p:nvPr/>
+        </p:nvSpPr>
+        <p:spPr>
+          <a:xfrm>
+            <a:off x="1313727" y="0"/>
+            <a:ext cx="8281686" cy="369332"/>
+          </a:xfrm>
+          <a:prstGeom prst="rect">
+            <a:avLst/>
+          </a:prstGeom>
+          <a:noFill/>
+        </p:spPr>
+        <p:txBody>
+          <a:bodyPr wrap="square">
+            <a:spAutoFit/>
+          </a:bodyPr>
+          <a:lstStyle/>
+          <a:p>
+            <a:r>
+              <a:rPr lang="en-US" dirty="0"/>
+              <a:t>13929-128-3:	Users/informant/</a:t>
+            </a:r>
+            <a:r>
+              <a:rPr lang="en-US" dirty="0" err="1"/>
+              <a:t>AppData</a:t>
+            </a:r>
+            <a:r>
+              <a:rPr lang="en-US" dirty="0"/>
+              <a:t>/Local/Microsoft/Windows/UsrClass.dat</a:t>
+            </a:r>
+          </a:p>
+        </p:txBody>
+      </p:sp>
     </p:spTree>
     <p:extLst>
       <p:ext uri="{BB962C8B-B14F-4D97-AF65-F5344CB8AC3E}">
@@ -10782,7 +12083,7 @@
 </p:sld>
 </file>
 
-<file path=ppt/slides/slide4.xml><?xml version="1.0" encoding="utf-8"?>
+<file path=ppt/slides/slide5.xml><?xml version="1.0" encoding="utf-8"?>
 <p:sld xmlns:a="http://schemas.openxmlformats.org/drawingml/2006/main" xmlns:r="http://schemas.openxmlformats.org/officeDocument/2006/relationships" xmlns:p="http://schemas.openxmlformats.org/presentationml/2006/main">
   <p:cSld>
     <p:spTree>
@@ -10904,78 +12205,195 @@
           </a:p>
         </p:txBody>
       </p:sp>
-      <p:pic>
-        <p:nvPicPr>
-          <p:cNvPr id="5" name="Picture 4"/>
-          <p:cNvPicPr>
-            <a:picLocks noChangeAspect="1"/>
-          </p:cNvPicPr>
+      <p:sp>
+        <p:nvSpPr>
+          <p:cNvPr id="7" name="TextBox 6">
+            <a:extLst>
+              <a:ext uri="{FF2B5EF4-FFF2-40B4-BE49-F238E27FC236}">
+                <a16:creationId xmlns:a16="http://schemas.microsoft.com/office/drawing/2014/main" id="{4EC7A8FB-A718-4708-BCF8-7B8FEEEA11CD}"/>
+              </a:ext>
+            </a:extLst>
+          </p:cNvPr>
+          <p:cNvSpPr txBox="1"/>
           <p:nvPr/>
-        </p:nvPicPr>
-        <p:blipFill>
-          <a:blip r:embed="rId4"/>
-          <a:stretch>
-            <a:fillRect/>
-          </a:stretch>
-        </p:blipFill>
+        </p:nvSpPr>
         <p:spPr>
           <a:xfrm>
-            <a:off x="838200" y="4582433"/>
-            <a:ext cx="8756139" cy="1630821"/>
+            <a:off x="3070860" y="4861400"/>
+            <a:ext cx="7874143" cy="369332"/>
           </a:xfrm>
           <a:prstGeom prst="rect">
             <a:avLst/>
           </a:prstGeom>
+          <a:noFill/>
         </p:spPr>
-      </p:pic>
-      <p:sp>
-        <p:nvSpPr>
-          <p:cNvPr id="6" name="TextBox 5"/>
-          <p:cNvSpPr txBox="1"/>
+        <p:txBody>
+          <a:bodyPr wrap="none" rtlCol="0">
+            <a:spAutoFit/>
+          </a:bodyPr>
+          <a:lstStyle/>
+          <a:p>
+            <a:r>
+              <a:rPr lang="en-US" dirty="0"/>
+              <a:t>We want to search for folder “</a:t>
+            </a:r>
+            <a:r>
+              <a:rPr lang="en-US" dirty="0">
+                <a:solidFill>
+                  <a:srgbClr val="FF0000"/>
+                </a:solidFill>
+              </a:rPr>
+              <a:t>Secret Project Data</a:t>
+            </a:r>
+            <a:r>
+              <a:rPr lang="en-US" dirty="0"/>
+              <a:t>” to find possible Mapped Letter.</a:t>
+            </a:r>
+          </a:p>
+        </p:txBody>
+      </p:sp>
+      <p:cxnSp>
+        <p:nvCxnSpPr>
+          <p:cNvPr id="9" name="Straight Arrow Connector 8">
+            <a:extLst>
+              <a:ext uri="{FF2B5EF4-FFF2-40B4-BE49-F238E27FC236}">
+                <a16:creationId xmlns:a16="http://schemas.microsoft.com/office/drawing/2014/main" id="{1E94DE38-CE42-40AC-A151-53C75E83A378}"/>
+              </a:ext>
+            </a:extLst>
+          </p:cNvPr>
+          <p:cNvCxnSpPr>
+            <a:cxnSpLocks/>
+          </p:cNvCxnSpPr>
+          <p:nvPr/>
+        </p:nvCxnSpPr>
+        <p:spPr>
+          <a:xfrm flipV="1">
+            <a:off x="7741920" y="3101340"/>
+            <a:ext cx="1447800" cy="1691640"/>
+          </a:xfrm>
+          <a:prstGeom prst="straightConnector1">
+            <a:avLst/>
+          </a:prstGeom>
+          <a:ln>
+            <a:tailEnd type="triangle"/>
+          </a:ln>
+        </p:spPr>
+        <p:style>
+          <a:lnRef idx="1">
+            <a:schemeClr val="accent2"/>
+          </a:lnRef>
+          <a:fillRef idx="0">
+            <a:schemeClr val="accent2"/>
+          </a:fillRef>
+          <a:effectRef idx="0">
+            <a:schemeClr val="accent2"/>
+          </a:effectRef>
+          <a:fontRef idx="minor">
+            <a:schemeClr val="tx1"/>
+          </a:fontRef>
+        </p:style>
+      </p:cxnSp>
+      <p:sp>
+        <p:nvSpPr>
+          <p:cNvPr id="10" name="Rectangle 9">
+            <a:extLst>
+              <a:ext uri="{FF2B5EF4-FFF2-40B4-BE49-F238E27FC236}">
+                <a16:creationId xmlns:a16="http://schemas.microsoft.com/office/drawing/2014/main" id="{63B22BAB-3138-4EFE-8912-752AF35655E7}"/>
+              </a:ext>
+            </a:extLst>
+          </p:cNvPr>
+          <p:cNvSpPr/>
           <p:nvPr/>
         </p:nvSpPr>
         <p:spPr>
           <a:xfrm>
-            <a:off x="838199" y="4213101"/>
-            <a:ext cx="3110147" cy="369332"/>
+            <a:off x="8823960" y="2834640"/>
+            <a:ext cx="1021080" cy="266700"/>
           </a:xfrm>
           <a:prstGeom prst="rect">
             <a:avLst/>
           </a:prstGeom>
-          <a:solidFill>
-            <a:srgbClr val="FFC000"/>
-          </a:solidFill>
+          <a:noFill/>
+          <a:ln>
+            <a:solidFill>
+              <a:srgbClr val="FFFF00"/>
+            </a:solidFill>
+          </a:ln>
         </p:spPr>
-        <p:txBody>
-          <a:bodyPr wrap="none" rtlCol="0">
-            <a:spAutoFit/>
-          </a:bodyPr>
-          <a:lstStyle/>
-          <a:p>
-            <a:r>
-              <a:rPr lang="en-US" dirty="0"/>
-              <a:t>Exam </a:t>
-            </a:r>
-            <a:r>
-              <a:rPr lang="en-US" i="1" dirty="0">
-                <a:solidFill>
-                  <a:srgbClr val="007DB5"/>
-                </a:solidFill>
-              </a:rPr>
-              <a:t>Jump list </a:t>
-            </a:r>
-            <a:r>
-              <a:rPr lang="en-US" dirty="0"/>
-              <a:t>volume letter </a:t>
-            </a:r>
-            <a:r>
-              <a:rPr lang="en-US" dirty="0">
-                <a:solidFill>
-                  <a:srgbClr val="FF0000"/>
-                </a:solidFill>
-              </a:rPr>
-              <a:t>V:</a:t>
-            </a:r>
+        <p:style>
+          <a:lnRef idx="2">
+            <a:schemeClr val="accent1">
+              <a:shade val="50000"/>
+            </a:schemeClr>
+          </a:lnRef>
+          <a:fillRef idx="1">
+            <a:schemeClr val="accent1"/>
+          </a:fillRef>
+          <a:effectRef idx="0">
+            <a:schemeClr val="accent1"/>
+          </a:effectRef>
+          <a:fontRef idx="minor">
+            <a:schemeClr val="lt1"/>
+          </a:fontRef>
+        </p:style>
+        <p:txBody>
+          <a:bodyPr rtlCol="0" anchor="ctr"/>
+          <a:lstStyle/>
+          <a:p>
+            <a:pPr algn="ctr"/>
+            <a:endParaRPr lang="en-US"/>
+          </a:p>
+        </p:txBody>
+      </p:sp>
+      <p:sp>
+        <p:nvSpPr>
+          <p:cNvPr id="11" name="Rectangle 10">
+            <a:extLst>
+              <a:ext uri="{FF2B5EF4-FFF2-40B4-BE49-F238E27FC236}">
+                <a16:creationId xmlns:a16="http://schemas.microsoft.com/office/drawing/2014/main" id="{E19AC702-D50F-4F43-987E-F9B6B1119D96}"/>
+              </a:ext>
+            </a:extLst>
+          </p:cNvPr>
+          <p:cNvSpPr/>
+          <p:nvPr/>
+        </p:nvSpPr>
+        <p:spPr>
+          <a:xfrm>
+            <a:off x="838200" y="3032383"/>
+            <a:ext cx="1188720" cy="266700"/>
+          </a:xfrm>
+          <a:prstGeom prst="rect">
+            <a:avLst/>
+          </a:prstGeom>
+          <a:noFill/>
+          <a:ln>
+            <a:solidFill>
+              <a:srgbClr val="FFFF00"/>
+            </a:solidFill>
+          </a:ln>
+        </p:spPr>
+        <p:style>
+          <a:lnRef idx="2">
+            <a:schemeClr val="accent1">
+              <a:shade val="50000"/>
+            </a:schemeClr>
+          </a:lnRef>
+          <a:fillRef idx="1">
+            <a:schemeClr val="accent1"/>
+          </a:fillRef>
+          <a:effectRef idx="0">
+            <a:schemeClr val="accent1"/>
+          </a:effectRef>
+          <a:fontRef idx="minor">
+            <a:schemeClr val="lt1"/>
+          </a:fontRef>
+        </p:style>
+        <p:txBody>
+          <a:bodyPr rtlCol="0" anchor="ctr"/>
+          <a:lstStyle/>
+          <a:p>
+            <a:pPr algn="ctr"/>
+            <a:endParaRPr lang="en-US"/>
           </a:p>
         </p:txBody>
       </p:sp>
@@ -10992,7 +12410,333 @@
 </p:sld>
 </file>
 
-<file path=ppt/slides/slide5.xml><?xml version="1.0" encoding="utf-8"?>
+<file path=ppt/slides/slide6.xml><?xml version="1.0" encoding="utf-8"?>
+<p:sld xmlns:a="http://schemas.openxmlformats.org/drawingml/2006/main" xmlns:r="http://schemas.openxmlformats.org/officeDocument/2006/relationships" xmlns:p="http://schemas.openxmlformats.org/presentationml/2006/main">
+  <p:cSld>
+    <p:spTree>
+      <p:nvGrpSpPr>
+        <p:cNvPr id="1" name=""/>
+        <p:cNvGrpSpPr/>
+        <p:nvPr/>
+      </p:nvGrpSpPr>
+      <p:grpSpPr>
+        <a:xfrm>
+          <a:off x="0" y="0"/>
+          <a:ext cx="0" cy="0"/>
+          <a:chOff x="0" y="0"/>
+          <a:chExt cx="0" cy="0"/>
+        </a:xfrm>
+      </p:grpSpPr>
+      <p:pic>
+        <p:nvPicPr>
+          <p:cNvPr id="4" name="Picture 3">
+            <a:extLst>
+              <a:ext uri="{FF2B5EF4-FFF2-40B4-BE49-F238E27FC236}">
+                <a16:creationId xmlns:a16="http://schemas.microsoft.com/office/drawing/2014/main" id="{07D2826B-24FA-4CA1-8683-49A9A80BAE2C}"/>
+              </a:ext>
+            </a:extLst>
+          </p:cNvPr>
+          <p:cNvPicPr>
+            <a:picLocks noChangeAspect="1"/>
+          </p:cNvPicPr>
+          <p:nvPr/>
+        </p:nvPicPr>
+        <p:blipFill>
+          <a:blip r:embed="rId3"/>
+          <a:stretch>
+            <a:fillRect/>
+          </a:stretch>
+        </p:blipFill>
+        <p:spPr>
+          <a:xfrm>
+            <a:off x="643433" y="1622896"/>
+            <a:ext cx="10539373" cy="3779848"/>
+          </a:xfrm>
+          <a:prstGeom prst="rect">
+            <a:avLst/>
+          </a:prstGeom>
+        </p:spPr>
+      </p:pic>
+      <p:sp>
+        <p:nvSpPr>
+          <p:cNvPr id="5" name="TextBox 4">
+            <a:extLst>
+              <a:ext uri="{FF2B5EF4-FFF2-40B4-BE49-F238E27FC236}">
+                <a16:creationId xmlns:a16="http://schemas.microsoft.com/office/drawing/2014/main" id="{03A1B2C4-15C4-47A7-AE04-609C4C173A2D}"/>
+              </a:ext>
+            </a:extLst>
+          </p:cNvPr>
+          <p:cNvSpPr txBox="1"/>
+          <p:nvPr/>
+        </p:nvSpPr>
+        <p:spPr>
+          <a:xfrm>
+            <a:off x="643433" y="1253564"/>
+            <a:ext cx="3050963" cy="369332"/>
+          </a:xfrm>
+          <a:prstGeom prst="rect">
+            <a:avLst/>
+          </a:prstGeom>
+          <a:solidFill>
+            <a:srgbClr val="FFC000"/>
+          </a:solidFill>
+        </p:spPr>
+        <p:txBody>
+          <a:bodyPr wrap="none" rtlCol="0">
+            <a:spAutoFit/>
+          </a:bodyPr>
+          <a:lstStyle/>
+          <a:p>
+            <a:r>
+              <a:rPr lang="en-US" dirty="0"/>
+              <a:t>Search for mapped drive letter</a:t>
+            </a:r>
+          </a:p>
+        </p:txBody>
+      </p:sp>
+      <p:sp>
+        <p:nvSpPr>
+          <p:cNvPr id="6" name="Rectangle 5">
+            <a:extLst>
+              <a:ext uri="{FF2B5EF4-FFF2-40B4-BE49-F238E27FC236}">
+                <a16:creationId xmlns:a16="http://schemas.microsoft.com/office/drawing/2014/main" id="{ABB5FCAE-D7B5-4F62-99E4-49D0DC08E07A}"/>
+              </a:ext>
+            </a:extLst>
+          </p:cNvPr>
+          <p:cNvSpPr/>
+          <p:nvPr/>
+        </p:nvSpPr>
+        <p:spPr>
+          <a:xfrm>
+            <a:off x="2979420" y="4351020"/>
+            <a:ext cx="312420" cy="266700"/>
+          </a:xfrm>
+          <a:prstGeom prst="rect">
+            <a:avLst/>
+          </a:prstGeom>
+          <a:noFill/>
+          <a:ln w="28575">
+            <a:solidFill>
+              <a:srgbClr val="FFFF00"/>
+            </a:solidFill>
+          </a:ln>
+        </p:spPr>
+        <p:style>
+          <a:lnRef idx="2">
+            <a:schemeClr val="accent1">
+              <a:shade val="50000"/>
+            </a:schemeClr>
+          </a:lnRef>
+          <a:fillRef idx="1">
+            <a:schemeClr val="accent1"/>
+          </a:fillRef>
+          <a:effectRef idx="0">
+            <a:schemeClr val="accent1"/>
+          </a:effectRef>
+          <a:fontRef idx="minor">
+            <a:schemeClr val="lt1"/>
+          </a:fontRef>
+        </p:style>
+        <p:txBody>
+          <a:bodyPr rtlCol="0" anchor="ctr"/>
+          <a:lstStyle/>
+          <a:p>
+            <a:pPr algn="ctr"/>
+            <a:endParaRPr lang="en-US"/>
+          </a:p>
+        </p:txBody>
+      </p:sp>
+      <p:sp>
+        <p:nvSpPr>
+          <p:cNvPr id="7" name="Rectangle 6">
+            <a:extLst>
+              <a:ext uri="{FF2B5EF4-FFF2-40B4-BE49-F238E27FC236}">
+                <a16:creationId xmlns:a16="http://schemas.microsoft.com/office/drawing/2014/main" id="{438C8748-730C-4849-B0FD-20F87A59CB5D}"/>
+              </a:ext>
+            </a:extLst>
+          </p:cNvPr>
+          <p:cNvSpPr/>
+          <p:nvPr/>
+        </p:nvSpPr>
+        <p:spPr>
+          <a:xfrm>
+            <a:off x="5478780" y="2956560"/>
+            <a:ext cx="312420" cy="266700"/>
+          </a:xfrm>
+          <a:prstGeom prst="rect">
+            <a:avLst/>
+          </a:prstGeom>
+          <a:noFill/>
+          <a:ln w="28575">
+            <a:solidFill>
+              <a:srgbClr val="FFFF00"/>
+            </a:solidFill>
+          </a:ln>
+        </p:spPr>
+        <p:style>
+          <a:lnRef idx="2">
+            <a:schemeClr val="accent1">
+              <a:shade val="50000"/>
+            </a:schemeClr>
+          </a:lnRef>
+          <a:fillRef idx="1">
+            <a:schemeClr val="accent1"/>
+          </a:fillRef>
+          <a:effectRef idx="0">
+            <a:schemeClr val="accent1"/>
+          </a:effectRef>
+          <a:fontRef idx="minor">
+            <a:schemeClr val="lt1"/>
+          </a:fontRef>
+        </p:style>
+        <p:txBody>
+          <a:bodyPr rtlCol="0" anchor="ctr"/>
+          <a:lstStyle/>
+          <a:p>
+            <a:pPr algn="ctr"/>
+            <a:endParaRPr lang="en-US"/>
+          </a:p>
+        </p:txBody>
+      </p:sp>
+    </p:spTree>
+    <p:extLst>
+      <p:ext uri="{BB962C8B-B14F-4D97-AF65-F5344CB8AC3E}">
+        <p14:creationId xmlns:p14="http://schemas.microsoft.com/office/powerpoint/2010/main" val="2640566923"/>
+      </p:ext>
+    </p:extLst>
+  </p:cSld>
+  <p:clrMapOvr>
+    <a:masterClrMapping/>
+  </p:clrMapOvr>
+</p:sld>
+</file>
+
+<file path=ppt/slides/slide7.xml><?xml version="1.0" encoding="utf-8"?>
+<p:sld xmlns:a="http://schemas.openxmlformats.org/drawingml/2006/main" xmlns:r="http://schemas.openxmlformats.org/officeDocument/2006/relationships" xmlns:p="http://schemas.openxmlformats.org/presentationml/2006/main">
+  <p:cSld>
+    <p:spTree>
+      <p:nvGrpSpPr>
+        <p:cNvPr id="1" name=""/>
+        <p:cNvGrpSpPr/>
+        <p:nvPr/>
+      </p:nvGrpSpPr>
+      <p:grpSpPr>
+        <a:xfrm>
+          <a:off x="0" y="0"/>
+          <a:ext cx="0" cy="0"/>
+          <a:chOff x="0" y="0"/>
+          <a:chExt cx="0" cy="0"/>
+        </a:xfrm>
+      </p:grpSpPr>
+      <p:pic>
+        <p:nvPicPr>
+          <p:cNvPr id="3" name="Picture 2">
+            <a:extLst>
+              <a:ext uri="{FF2B5EF4-FFF2-40B4-BE49-F238E27FC236}">
+                <a16:creationId xmlns:a16="http://schemas.microsoft.com/office/drawing/2014/main" id="{07F89BB5-471F-4A85-8381-073BB5AB5A0D}"/>
+              </a:ext>
+            </a:extLst>
+          </p:cNvPr>
+          <p:cNvPicPr>
+            <a:picLocks noChangeAspect="1"/>
+          </p:cNvPicPr>
+          <p:nvPr/>
+        </p:nvPicPr>
+        <p:blipFill>
+          <a:blip r:embed="rId3"/>
+          <a:stretch>
+            <a:fillRect/>
+          </a:stretch>
+        </p:blipFill>
+        <p:spPr>
+          <a:xfrm>
+            <a:off x="1097280" y="2613589"/>
+            <a:ext cx="8756139" cy="1630821"/>
+          </a:xfrm>
+          <a:prstGeom prst="rect">
+            <a:avLst/>
+          </a:prstGeom>
+        </p:spPr>
+      </p:pic>
+      <p:sp>
+        <p:nvSpPr>
+          <p:cNvPr id="4" name="TextBox 3">
+            <a:extLst>
+              <a:ext uri="{FF2B5EF4-FFF2-40B4-BE49-F238E27FC236}">
+                <a16:creationId xmlns:a16="http://schemas.microsoft.com/office/drawing/2014/main" id="{BDD03DC8-96B7-48A0-B081-D8D26ED63FE0}"/>
+              </a:ext>
+            </a:extLst>
+          </p:cNvPr>
+          <p:cNvSpPr txBox="1"/>
+          <p:nvPr/>
+        </p:nvSpPr>
+        <p:spPr>
+          <a:xfrm>
+            <a:off x="1097279" y="2244257"/>
+            <a:ext cx="5930406" cy="369332"/>
+          </a:xfrm>
+          <a:prstGeom prst="rect">
+            <a:avLst/>
+          </a:prstGeom>
+          <a:solidFill>
+            <a:srgbClr val="FFC000"/>
+          </a:solidFill>
+        </p:spPr>
+        <p:txBody>
+          <a:bodyPr wrap="none" rtlCol="0">
+            <a:spAutoFit/>
+          </a:bodyPr>
+          <a:lstStyle/>
+          <a:p>
+            <a:r>
+              <a:rPr lang="en-US" dirty="0"/>
+              <a:t>Find </a:t>
+            </a:r>
+            <a:r>
+              <a:rPr lang="en-US"/>
+              <a:t>traversed folders </a:t>
+            </a:r>
+            <a:r>
+              <a:rPr lang="en-US" dirty="0"/>
+              <a:t>by examining </a:t>
+            </a:r>
+            <a:r>
+              <a:rPr lang="en-US" i="1" dirty="0">
+                <a:solidFill>
+                  <a:srgbClr val="007DB5"/>
+                </a:solidFill>
+              </a:rPr>
+              <a:t>Jump list </a:t>
+            </a:r>
+            <a:r>
+              <a:rPr lang="en-US" dirty="0"/>
+              <a:t>volume letter </a:t>
+            </a:r>
+            <a:r>
+              <a:rPr lang="en-US" dirty="0">
+                <a:solidFill>
+                  <a:srgbClr val="FF0000"/>
+                </a:solidFill>
+              </a:rPr>
+              <a:t>V:</a:t>
+            </a:r>
+          </a:p>
+        </p:txBody>
+      </p:sp>
+    </p:spTree>
+    <p:extLst>
+      <p:ext uri="{BB962C8B-B14F-4D97-AF65-F5344CB8AC3E}">
+        <p14:creationId xmlns:p14="http://schemas.microsoft.com/office/powerpoint/2010/main" val="2027897214"/>
+      </p:ext>
+    </p:extLst>
+  </p:cSld>
+  <p:clrMapOvr>
+    <a:masterClrMapping/>
+  </p:clrMapOvr>
+</p:sld>
+</file>
+
+<file path=ppt/slides/slide8.xml><?xml version="1.0" encoding="utf-8"?>
 <p:sld xmlns:a="http://schemas.openxmlformats.org/drawingml/2006/main" xmlns:r="http://schemas.openxmlformats.org/officeDocument/2006/relationships" xmlns:p="http://schemas.openxmlformats.org/presentationml/2006/main">
   <p:cSld>
     <p:spTree>
@@ -11154,7 +12898,7 @@
 </p:sld>
 </file>
 
-<file path=ppt/slides/slide6.xml><?xml version="1.0" encoding="utf-8"?>
+<file path=ppt/slides/slide9.xml><?xml version="1.0" encoding="utf-8"?>
 <p:sld xmlns:a="http://schemas.openxmlformats.org/drawingml/2006/main" xmlns:r="http://schemas.openxmlformats.org/officeDocument/2006/relationships" xmlns:p="http://schemas.openxmlformats.org/presentationml/2006/main">
   <p:cSld>
     <p:spTree>
@@ -11209,498 +12953,6 @@
     <p:extLst>
       <p:ext uri="{BB962C8B-B14F-4D97-AF65-F5344CB8AC3E}">
         <p14:creationId xmlns:p14="http://schemas.microsoft.com/office/powerpoint/2010/main" val="770036564"/>
-      </p:ext>
-    </p:extLst>
-  </p:cSld>
-  <p:clrMapOvr>
-    <a:masterClrMapping/>
-  </p:clrMapOvr>
-</p:sld>
-</file>
-
-<file path=ppt/slides/slide7.xml><?xml version="1.0" encoding="utf-8"?>
-<p:sld xmlns:a="http://schemas.openxmlformats.org/drawingml/2006/main" xmlns:r="http://schemas.openxmlformats.org/officeDocument/2006/relationships" xmlns:p="http://schemas.openxmlformats.org/presentationml/2006/main">
-  <p:cSld>
-    <p:spTree>
-      <p:nvGrpSpPr>
-        <p:cNvPr id="1" name=""/>
-        <p:cNvGrpSpPr/>
-        <p:nvPr/>
-      </p:nvGrpSpPr>
-      <p:grpSpPr>
-        <a:xfrm>
-          <a:off x="0" y="0"/>
-          <a:ext cx="0" cy="0"/>
-          <a:chOff x="0" y="0"/>
-          <a:chExt cx="0" cy="0"/>
-        </a:xfrm>
-      </p:grpSpPr>
-      <p:sp>
-        <p:nvSpPr>
-          <p:cNvPr id="2" name="Title 1"/>
-          <p:cNvSpPr>
-            <a:spLocks noGrp="1"/>
-          </p:cNvSpPr>
-          <p:nvPr>
-            <p:ph type="title"/>
-          </p:nvPr>
-        </p:nvSpPr>
-        <p:spPr/>
-        <p:txBody>
-          <a:bodyPr/>
-          <a:lstStyle/>
-          <a:p>
-            <a:r>
-              <a:rPr lang="en-US" dirty="0"/>
-              <a:t>Link </a:t>
-            </a:r>
-            <a:r>
-              <a:rPr lang="en-US" i="1" dirty="0">
-                <a:solidFill>
-                  <a:srgbClr val="FF0000"/>
-                </a:solidFill>
-              </a:rPr>
-              <a:t>.</a:t>
-            </a:r>
-            <a:r>
-              <a:rPr lang="en-US" i="1" dirty="0" err="1">
-                <a:solidFill>
-                  <a:srgbClr val="FF0000"/>
-                </a:solidFill>
-              </a:rPr>
-              <a:t>lnk</a:t>
-            </a:r>
-            <a:r>
-              <a:rPr lang="en-US" i="1" dirty="0">
-                <a:solidFill>
-                  <a:srgbClr val="FF0000"/>
-                </a:solidFill>
-              </a:rPr>
-              <a:t> </a:t>
-            </a:r>
-            <a:r>
-              <a:rPr lang="en-US" dirty="0"/>
-              <a:t>Files Location</a:t>
-            </a:r>
-          </a:p>
-        </p:txBody>
-      </p:sp>
-      <p:sp>
-        <p:nvSpPr>
-          <p:cNvPr id="3" name="Content Placeholder 2"/>
-          <p:cNvSpPr>
-            <a:spLocks noGrp="1"/>
-          </p:cNvSpPr>
-          <p:nvPr>
-            <p:ph idx="1"/>
-          </p:nvPr>
-        </p:nvSpPr>
-        <p:spPr/>
-        <p:txBody>
-          <a:bodyPr/>
-          <a:lstStyle/>
-          <a:p>
-            <a:r>
-              <a:rPr lang="en-US" dirty="0"/>
-              <a:t>Recently used files via links</a:t>
-            </a:r>
-          </a:p>
-          <a:p>
-            <a:pPr lvl="1"/>
-            <a:r>
-              <a:rPr lang="en-US" dirty="0"/>
-              <a:t>Windows and Office</a:t>
-            </a:r>
-          </a:p>
-          <a:p>
-            <a:r>
-              <a:rPr lang="en-US" dirty="0"/>
-              <a:t>Windows 7 to 10 </a:t>
-            </a:r>
-          </a:p>
-          <a:p>
-            <a:pPr lvl="1"/>
-            <a:r>
-              <a:rPr lang="en-US" i="1" dirty="0">
-                <a:solidFill>
-                  <a:srgbClr val="7030A0"/>
-                </a:solidFill>
-              </a:rPr>
-              <a:t>C:\Users\%USERNAME%\AppData\Roaming\Microsoft\Windows\Recent</a:t>
-            </a:r>
-          </a:p>
-          <a:p>
-            <a:pPr lvl="1"/>
-            <a:r>
-              <a:rPr lang="en-US" i="1" dirty="0">
-                <a:solidFill>
-                  <a:srgbClr val="7030A0"/>
-                </a:solidFill>
-              </a:rPr>
-              <a:t>C:\Users\%USERNAME%\AppData\Roaming\Microsoft\Office\Recent\</a:t>
-            </a:r>
-          </a:p>
-          <a:p>
-            <a:r>
-              <a:rPr lang="en-US" dirty="0"/>
-              <a:t>Windows XP</a:t>
-            </a:r>
-          </a:p>
-          <a:p>
-            <a:pPr lvl="1"/>
-            <a:r>
-              <a:rPr lang="en-US" i="1" dirty="0">
-                <a:solidFill>
-                  <a:srgbClr val="7030A0"/>
-                </a:solidFill>
-              </a:rPr>
-              <a:t>C:\Documents and Settings\%USERNAME%\Recent</a:t>
-            </a:r>
-          </a:p>
-        </p:txBody>
-      </p:sp>
-    </p:spTree>
-    <p:extLst>
-      <p:ext uri="{BB962C8B-B14F-4D97-AF65-F5344CB8AC3E}">
-        <p14:creationId xmlns:p14="http://schemas.microsoft.com/office/powerpoint/2010/main" val="209040179"/>
-      </p:ext>
-    </p:extLst>
-  </p:cSld>
-  <p:clrMapOvr>
-    <a:masterClrMapping/>
-  </p:clrMapOvr>
-</p:sld>
-</file>
-
-<file path=ppt/slides/slide8.xml><?xml version="1.0" encoding="utf-8"?>
-<p:sld xmlns:a="http://schemas.openxmlformats.org/drawingml/2006/main" xmlns:r="http://schemas.openxmlformats.org/officeDocument/2006/relationships" xmlns:p="http://schemas.openxmlformats.org/presentationml/2006/main">
-  <p:cSld>
-    <p:spTree>
-      <p:nvGrpSpPr>
-        <p:cNvPr id="1" name=""/>
-        <p:cNvGrpSpPr/>
-        <p:nvPr/>
-      </p:nvGrpSpPr>
-      <p:grpSpPr>
-        <a:xfrm>
-          <a:off x="0" y="0"/>
-          <a:ext cx="0" cy="0"/>
-          <a:chOff x="0" y="0"/>
-          <a:chExt cx="0" cy="0"/>
-        </a:xfrm>
-      </p:grpSpPr>
-      <p:pic>
-        <p:nvPicPr>
-          <p:cNvPr id="2" name="Picture 1"/>
-          <p:cNvPicPr>
-            <a:picLocks noChangeAspect="1"/>
-          </p:cNvPicPr>
-          <p:nvPr/>
-        </p:nvPicPr>
-        <p:blipFill>
-          <a:blip r:embed="rId3"/>
-          <a:stretch>
-            <a:fillRect/>
-          </a:stretch>
-        </p:blipFill>
-        <p:spPr>
-          <a:xfrm>
-            <a:off x="873539" y="1248343"/>
-            <a:ext cx="9631840" cy="2486943"/>
-          </a:xfrm>
-          <a:prstGeom prst="rect">
-            <a:avLst/>
-          </a:prstGeom>
-        </p:spPr>
-      </p:pic>
-      <p:sp>
-        <p:nvSpPr>
-          <p:cNvPr id="3" name="TextBox 2"/>
-          <p:cNvSpPr txBox="1"/>
-          <p:nvPr/>
-        </p:nvSpPr>
-        <p:spPr>
-          <a:xfrm>
-            <a:off x="873539" y="879011"/>
-            <a:ext cx="2054217" cy="369332"/>
-          </a:xfrm>
-          <a:prstGeom prst="rect">
-            <a:avLst/>
-          </a:prstGeom>
-          <a:solidFill>
-            <a:srgbClr val="FFC000"/>
-          </a:solidFill>
-        </p:spPr>
-        <p:txBody>
-          <a:bodyPr wrap="none" rtlCol="0">
-            <a:spAutoFit/>
-          </a:bodyPr>
-          <a:lstStyle/>
-          <a:p>
-            <a:r>
-              <a:rPr lang="en-US" dirty="0"/>
-              <a:t>Check Windows</a:t>
-            </a:r>
-            <a:r>
-              <a:rPr lang="en-US" i="1" dirty="0">
-                <a:solidFill>
-                  <a:srgbClr val="7030A0"/>
-                </a:solidFill>
-              </a:rPr>
-              <a:t> .</a:t>
-            </a:r>
-            <a:r>
-              <a:rPr lang="en-US" i="1" dirty="0" err="1">
-                <a:solidFill>
-                  <a:srgbClr val="7030A0"/>
-                </a:solidFill>
-              </a:rPr>
-              <a:t>lnk</a:t>
-            </a:r>
-            <a:endParaRPr lang="en-US" i="1" dirty="0">
-              <a:solidFill>
-                <a:srgbClr val="7030A0"/>
-              </a:solidFill>
-            </a:endParaRPr>
-          </a:p>
-        </p:txBody>
-      </p:sp>
-      <p:pic>
-        <p:nvPicPr>
-          <p:cNvPr id="4" name="Picture 3"/>
-          <p:cNvPicPr>
-            <a:picLocks noChangeAspect="1"/>
-          </p:cNvPicPr>
-          <p:nvPr/>
-        </p:nvPicPr>
-        <p:blipFill>
-          <a:blip r:embed="rId4"/>
-          <a:stretch>
-            <a:fillRect/>
-          </a:stretch>
-        </p:blipFill>
-        <p:spPr>
-          <a:xfrm>
-            <a:off x="873540" y="4421260"/>
-            <a:ext cx="9701426" cy="1484327"/>
-          </a:xfrm>
-          <a:prstGeom prst="rect">
-            <a:avLst/>
-          </a:prstGeom>
-        </p:spPr>
-      </p:pic>
-      <p:sp>
-        <p:nvSpPr>
-          <p:cNvPr id="5" name="TextBox 4"/>
-          <p:cNvSpPr txBox="1"/>
-          <p:nvPr/>
-        </p:nvSpPr>
-        <p:spPr>
-          <a:xfrm>
-            <a:off x="873539" y="4051928"/>
-            <a:ext cx="1743747" cy="369332"/>
-          </a:xfrm>
-          <a:prstGeom prst="rect">
-            <a:avLst/>
-          </a:prstGeom>
-          <a:solidFill>
-            <a:srgbClr val="FFC000"/>
-          </a:solidFill>
-        </p:spPr>
-        <p:txBody>
-          <a:bodyPr wrap="none" rtlCol="0">
-            <a:spAutoFit/>
-          </a:bodyPr>
-          <a:lstStyle/>
-          <a:p>
-            <a:r>
-              <a:rPr lang="en-US" dirty="0"/>
-              <a:t>Check Office</a:t>
-            </a:r>
-            <a:r>
-              <a:rPr lang="en-US" i="1" dirty="0">
-                <a:solidFill>
-                  <a:srgbClr val="7030A0"/>
-                </a:solidFill>
-              </a:rPr>
-              <a:t> .</a:t>
-            </a:r>
-            <a:r>
-              <a:rPr lang="en-US" i="1" dirty="0" err="1">
-                <a:solidFill>
-                  <a:srgbClr val="7030A0"/>
-                </a:solidFill>
-              </a:rPr>
-              <a:t>lnk</a:t>
-            </a:r>
-            <a:endParaRPr lang="en-US" i="1" dirty="0">
-              <a:solidFill>
-                <a:srgbClr val="7030A0"/>
-              </a:solidFill>
-            </a:endParaRPr>
-          </a:p>
-        </p:txBody>
-      </p:sp>
-    </p:spTree>
-    <p:extLst>
-      <p:ext uri="{BB962C8B-B14F-4D97-AF65-F5344CB8AC3E}">
-        <p14:creationId xmlns:p14="http://schemas.microsoft.com/office/powerpoint/2010/main" val="2741262411"/>
-      </p:ext>
-    </p:extLst>
-  </p:cSld>
-  <p:clrMapOvr>
-    <a:masterClrMapping/>
-  </p:clrMapOvr>
-</p:sld>
-</file>
-
-<file path=ppt/slides/slide9.xml><?xml version="1.0" encoding="utf-8"?>
-<p:sld xmlns:a="http://schemas.openxmlformats.org/drawingml/2006/main" xmlns:r="http://schemas.openxmlformats.org/officeDocument/2006/relationships" xmlns:p="http://schemas.openxmlformats.org/presentationml/2006/main">
-  <p:cSld>
-    <p:spTree>
-      <p:nvGrpSpPr>
-        <p:cNvPr id="1" name=""/>
-        <p:cNvGrpSpPr/>
-        <p:nvPr/>
-      </p:nvGrpSpPr>
-      <p:grpSpPr>
-        <a:xfrm>
-          <a:off x="0" y="0"/>
-          <a:ext cx="0" cy="0"/>
-          <a:chOff x="0" y="0"/>
-          <a:chExt cx="0" cy="0"/>
-        </a:xfrm>
-      </p:grpSpPr>
-      <p:pic>
-        <p:nvPicPr>
-          <p:cNvPr id="2" name="Picture 1"/>
-          <p:cNvPicPr>
-            <a:picLocks noChangeAspect="1"/>
-          </p:cNvPicPr>
-          <p:nvPr/>
-        </p:nvPicPr>
-        <p:blipFill>
-          <a:blip r:embed="rId3"/>
-          <a:stretch>
-            <a:fillRect/>
-          </a:stretch>
-        </p:blipFill>
-        <p:spPr>
-          <a:xfrm>
-            <a:off x="838200" y="2129635"/>
-            <a:ext cx="9007621" cy="3574090"/>
-          </a:xfrm>
-          <a:prstGeom prst="rect">
-            <a:avLst/>
-          </a:prstGeom>
-        </p:spPr>
-      </p:pic>
-      <p:sp>
-        <p:nvSpPr>
-          <p:cNvPr id="3" name="TextBox 2"/>
-          <p:cNvSpPr txBox="1"/>
-          <p:nvPr/>
-        </p:nvSpPr>
-        <p:spPr>
-          <a:xfrm>
-            <a:off x="838200" y="1760303"/>
-            <a:ext cx="2567178" cy="369332"/>
-          </a:xfrm>
-          <a:prstGeom prst="rect">
-            <a:avLst/>
-          </a:prstGeom>
-          <a:solidFill>
-            <a:srgbClr val="FFC000"/>
-          </a:solidFill>
-        </p:spPr>
-        <p:txBody>
-          <a:bodyPr wrap="none" rtlCol="0">
-            <a:spAutoFit/>
-          </a:bodyPr>
-          <a:lstStyle/>
-          <a:p>
-            <a:r>
-              <a:rPr lang="en-US" dirty="0"/>
-              <a:t>View a </a:t>
-            </a:r>
-            <a:r>
-              <a:rPr lang="en-US" i="1" dirty="0">
-                <a:solidFill>
-                  <a:srgbClr val="7030A0"/>
-                </a:solidFill>
-              </a:rPr>
-              <a:t>.</a:t>
-            </a:r>
-            <a:r>
-              <a:rPr lang="en-US" i="1" dirty="0" err="1">
-                <a:solidFill>
-                  <a:srgbClr val="7030A0"/>
-                </a:solidFill>
-              </a:rPr>
-              <a:t>lnk</a:t>
-            </a:r>
-            <a:r>
-              <a:rPr lang="en-US" i="1" dirty="0">
-                <a:solidFill>
-                  <a:srgbClr val="7030A0"/>
-                </a:solidFill>
-              </a:rPr>
-              <a:t> </a:t>
-            </a:r>
-            <a:r>
-              <a:rPr lang="en-US" dirty="0"/>
-              <a:t>in binary form</a:t>
-            </a:r>
-          </a:p>
-        </p:txBody>
-      </p:sp>
-      <p:sp>
-        <p:nvSpPr>
-          <p:cNvPr id="4" name="Title 3"/>
-          <p:cNvSpPr>
-            <a:spLocks noGrp="1"/>
-          </p:cNvSpPr>
-          <p:nvPr>
-            <p:ph type="title"/>
-          </p:nvPr>
-        </p:nvSpPr>
-        <p:spPr/>
-        <p:txBody>
-          <a:bodyPr/>
-          <a:lstStyle/>
-          <a:p>
-            <a:r>
-              <a:rPr lang="en-US" dirty="0"/>
-              <a:t>How to view </a:t>
-            </a:r>
-            <a:r>
-              <a:rPr lang="en-US" i="1" dirty="0">
-                <a:solidFill>
-                  <a:srgbClr val="FF0000"/>
-                </a:solidFill>
-              </a:rPr>
-              <a:t>.</a:t>
-            </a:r>
-            <a:r>
-              <a:rPr lang="en-US" i="1" dirty="0" err="1">
-                <a:solidFill>
-                  <a:srgbClr val="FF0000"/>
-                </a:solidFill>
-              </a:rPr>
-              <a:t>lnk</a:t>
-            </a:r>
-            <a:endParaRPr lang="en-US" i="1" dirty="0">
-              <a:solidFill>
-                <a:srgbClr val="FF0000"/>
-              </a:solidFill>
-            </a:endParaRPr>
-          </a:p>
-        </p:txBody>
-      </p:sp>
-    </p:spTree>
-    <p:extLst>
-      <p:ext uri="{BB962C8B-B14F-4D97-AF65-F5344CB8AC3E}">
-        <p14:creationId xmlns:p14="http://schemas.microsoft.com/office/powerpoint/2010/main" val="3999839786"/>
       </p:ext>
     </p:extLst>
   </p:cSld>

</xml_diff>